<commit_message>
Add Status App and diagrams
</commit_message>
<xml_diff>
--- a/docs/nostria-infrastructure.pptx
+++ b/docs/nostria-infrastructure.pptx
@@ -6,6 +6,7 @@
   </p:sldMasterIdLst>
   <p:sldIdLst>
     <p:sldId id="257" r:id="rId2"/>
+    <p:sldId id="258" r:id="rId3"/>
   </p:sldIdLst>
   <p:sldSz cx="12192000" cy="6858000"/>
   <p:notesSz cx="6858000" cy="9144000"/>
@@ -104,6 +105,11 @@
       </a:defRPr>
     </a:lvl9pPr>
   </p:defaultTextStyle>
+  <p:extLst>
+    <p:ext uri="{EFAFB233-063F-42B5-8137-9DF3F51BA10A}">
+      <p15:sldGuideLst xmlns:p15="http://schemas.microsoft.com/office/powerpoint/2012/main"/>
+    </p:ext>
+  </p:extLst>
 </p:presentation>
 </file>
 
@@ -3356,7 +3362,7 @@
         </p:nvSpPr>
         <p:spPr>
           <a:xfrm>
-            <a:off x="10348717" y="1171197"/>
+            <a:off x="10348717" y="1696295"/>
             <a:ext cx="555890" cy="522056"/>
           </a:xfrm>
           <a:prstGeom prst="roundRect">
@@ -3419,7 +3425,7 @@
         </p:blipFill>
         <p:spPr bwMode="white">
           <a:xfrm>
-            <a:off x="10744662" y="1111525"/>
+            <a:off x="10744662" y="1636623"/>
             <a:ext cx="280055" cy="280055"/>
           </a:xfrm>
           <a:prstGeom prst="rect">
@@ -3445,7 +3451,7 @@
         </p:nvSpPr>
         <p:spPr>
           <a:xfrm>
-            <a:off x="10450520" y="1661912"/>
+            <a:off x="10450520" y="2187010"/>
             <a:ext cx="410690" cy="338554"/>
           </a:xfrm>
           <a:prstGeom prst="rect">
@@ -3480,7 +3486,7 @@
         </p:nvSpPr>
         <p:spPr>
           <a:xfrm>
-            <a:off x="226339" y="2115777"/>
+            <a:off x="226339" y="2640875"/>
             <a:ext cx="11543163" cy="3393536"/>
           </a:xfrm>
           <a:prstGeom prst="roundRect">
@@ -3543,7 +3549,7 @@
         </p:blipFill>
         <p:spPr bwMode="white">
           <a:xfrm>
-            <a:off x="11372301" y="2110842"/>
+            <a:off x="11372301" y="2635940"/>
             <a:ext cx="463990" cy="463990"/>
           </a:xfrm>
           <a:prstGeom prst="rect">
@@ -3569,7 +3575,7 @@
         </p:nvSpPr>
         <p:spPr>
           <a:xfrm>
-            <a:off x="5603919" y="5509313"/>
+            <a:off x="5603919" y="6034411"/>
             <a:ext cx="1033873" cy="338554"/>
           </a:xfrm>
           <a:prstGeom prst="rect">
@@ -3604,7 +3610,7 @@
         </p:nvSpPr>
         <p:spPr>
           <a:xfrm>
-            <a:off x="11228503" y="1176137"/>
+            <a:off x="11228503" y="1701235"/>
             <a:ext cx="555891" cy="522056"/>
           </a:xfrm>
           <a:prstGeom prst="roundRect">
@@ -3651,7 +3657,7 @@
         </p:nvSpPr>
         <p:spPr>
           <a:xfrm>
-            <a:off x="11268507" y="1690936"/>
+            <a:off x="11268507" y="2216034"/>
             <a:ext cx="567784" cy="338554"/>
           </a:xfrm>
           <a:prstGeom prst="rect">
@@ -3702,7 +3708,7 @@
         </p:blipFill>
         <p:spPr bwMode="white">
           <a:xfrm>
-            <a:off x="711610" y="2417534"/>
+            <a:off x="711610" y="2942632"/>
             <a:ext cx="635000" cy="635000"/>
           </a:xfrm>
           <a:prstGeom prst="rect">
@@ -3728,7 +3734,7 @@
         </p:nvSpPr>
         <p:spPr>
           <a:xfrm>
-            <a:off x="324430" y="3034427"/>
+            <a:off x="324430" y="3559525"/>
             <a:ext cx="1409360" cy="430887"/>
           </a:xfrm>
           <a:prstGeom prst="rect">
@@ -3793,7 +3799,7 @@
         </p:blipFill>
         <p:spPr bwMode="white">
           <a:xfrm>
-            <a:off x="6072539" y="2425533"/>
+            <a:off x="6072539" y="2950631"/>
             <a:ext cx="558769" cy="558769"/>
           </a:xfrm>
           <a:prstGeom prst="rect">
@@ -3819,7 +3825,7 @@
         </p:nvSpPr>
         <p:spPr>
           <a:xfrm>
-            <a:off x="5735709" y="2989412"/>
+            <a:off x="5735709" y="3514510"/>
             <a:ext cx="1236236" cy="430887"/>
           </a:xfrm>
           <a:prstGeom prst="rect">
@@ -3884,7 +3890,7 @@
         </p:blipFill>
         <p:spPr bwMode="white">
           <a:xfrm>
-            <a:off x="7441935" y="3592539"/>
+            <a:off x="7441935" y="4117637"/>
             <a:ext cx="635000" cy="635000"/>
           </a:xfrm>
           <a:prstGeom prst="rect">
@@ -3910,7 +3916,7 @@
         </p:nvSpPr>
         <p:spPr>
           <a:xfrm>
-            <a:off x="7110060" y="4189281"/>
+            <a:off x="7110060" y="4714379"/>
             <a:ext cx="1298752" cy="600164"/>
           </a:xfrm>
           <a:prstGeom prst="rect">
@@ -3988,7 +3994,7 @@
         </p:blipFill>
         <p:spPr bwMode="white">
           <a:xfrm>
-            <a:off x="4504944" y="1136298"/>
+            <a:off x="4504944" y="1661396"/>
             <a:ext cx="635000" cy="635000"/>
           </a:xfrm>
           <a:prstGeom prst="rect">
@@ -4014,7 +4020,7 @@
         </p:nvSpPr>
         <p:spPr>
           <a:xfrm>
-            <a:off x="3127780" y="1004818"/>
+            <a:off x="3127780" y="1529916"/>
             <a:ext cx="1316386" cy="938719"/>
           </a:xfrm>
           <a:prstGeom prst="rect">
@@ -4102,7 +4108,7 @@
         </p:nvSpPr>
         <p:spPr>
           <a:xfrm>
-            <a:off x="1765028" y="2992775"/>
+            <a:off x="1765028" y="3517873"/>
             <a:ext cx="1096774" cy="938719"/>
           </a:xfrm>
           <a:prstGeom prst="rect">
@@ -4206,7 +4212,7 @@
         </p:blipFill>
         <p:spPr bwMode="white">
           <a:xfrm>
-            <a:off x="1932430" y="2425534"/>
+            <a:off x="1932430" y="2950632"/>
             <a:ext cx="635000" cy="635000"/>
           </a:xfrm>
           <a:prstGeom prst="rect">
@@ -4232,7 +4238,7 @@
         </p:nvSpPr>
         <p:spPr>
           <a:xfrm>
-            <a:off x="3190614" y="2992775"/>
+            <a:off x="3190614" y="3517873"/>
             <a:ext cx="1159292" cy="938719"/>
           </a:xfrm>
           <a:prstGeom prst="rect">
@@ -4336,7 +4342,7 @@
         </p:blipFill>
         <p:spPr bwMode="white">
           <a:xfrm>
-            <a:off x="3389275" y="2425534"/>
+            <a:off x="3389275" y="2950632"/>
             <a:ext cx="635000" cy="635000"/>
           </a:xfrm>
           <a:prstGeom prst="rect">
@@ -4378,7 +4384,7 @@
         </p:blipFill>
         <p:spPr bwMode="white">
           <a:xfrm>
-            <a:off x="4020595" y="2449756"/>
+            <a:off x="4020595" y="2974854"/>
             <a:ext cx="317500" cy="317500"/>
           </a:xfrm>
           <a:prstGeom prst="rect">
@@ -4420,7 +4426,7 @@
         </p:blipFill>
         <p:spPr bwMode="white">
           <a:xfrm>
-            <a:off x="4020595" y="2719961"/>
+            <a:off x="4020595" y="3245059"/>
             <a:ext cx="317500" cy="317500"/>
           </a:xfrm>
           <a:prstGeom prst="rect">
@@ -4462,7 +4468,7 @@
         </p:blipFill>
         <p:spPr bwMode="white">
           <a:xfrm>
-            <a:off x="2588312" y="2417534"/>
+            <a:off x="2588312" y="2942632"/>
             <a:ext cx="317500" cy="317500"/>
           </a:xfrm>
           <a:prstGeom prst="rect">
@@ -4504,7 +4510,7 @@
         </p:blipFill>
         <p:spPr bwMode="white">
           <a:xfrm>
-            <a:off x="2588312" y="2687739"/>
+            <a:off x="2588312" y="3212837"/>
             <a:ext cx="317500" cy="317500"/>
           </a:xfrm>
           <a:prstGeom prst="rect">
@@ -4546,7 +4552,7 @@
         </p:blipFill>
         <p:spPr bwMode="white">
           <a:xfrm>
-            <a:off x="4881437" y="2425534"/>
+            <a:off x="4881437" y="2950632"/>
             <a:ext cx="558769" cy="558769"/>
           </a:xfrm>
           <a:prstGeom prst="rect">
@@ -4572,7 +4578,7 @@
         </p:nvSpPr>
         <p:spPr>
           <a:xfrm>
-            <a:off x="4549129" y="2992775"/>
+            <a:off x="4549129" y="3517873"/>
             <a:ext cx="1107996" cy="430887"/>
           </a:xfrm>
           <a:prstGeom prst="rect">
@@ -4637,7 +4643,7 @@
         </p:blipFill>
         <p:spPr bwMode="white">
           <a:xfrm>
-            <a:off x="711610" y="3669427"/>
+            <a:off x="711610" y="4194525"/>
             <a:ext cx="635000" cy="635000"/>
           </a:xfrm>
           <a:prstGeom prst="rect">
@@ -4663,7 +4669,7 @@
         </p:nvSpPr>
         <p:spPr>
           <a:xfrm>
-            <a:off x="630625" y="4268213"/>
+            <a:off x="630625" y="4793311"/>
             <a:ext cx="774571" cy="430887"/>
           </a:xfrm>
           <a:prstGeom prst="rect">
@@ -4715,7 +4721,7 @@
         </p:nvCxnSpPr>
         <p:spPr>
           <a:xfrm>
-            <a:off x="1029110" y="3438155"/>
+            <a:off x="1029110" y="3963253"/>
             <a:ext cx="0" cy="231272"/>
           </a:xfrm>
           <a:prstGeom prst="straightConnector1">
@@ -4771,7 +4777,7 @@
         </p:blipFill>
         <p:spPr bwMode="white">
           <a:xfrm>
-            <a:off x="8817047" y="3525420"/>
+            <a:off x="8817047" y="4050518"/>
             <a:ext cx="635000" cy="635000"/>
           </a:xfrm>
           <a:prstGeom prst="rect">
@@ -4797,7 +4803,7 @@
         </p:nvSpPr>
         <p:spPr>
           <a:xfrm>
-            <a:off x="8570569" y="4171580"/>
+            <a:off x="8570569" y="4696678"/>
             <a:ext cx="1107996" cy="430887"/>
           </a:xfrm>
           <a:prstGeom prst="rect">
@@ -4862,7 +4868,7 @@
         </p:blipFill>
         <p:spPr bwMode="white">
           <a:xfrm>
-            <a:off x="7467441" y="2417534"/>
+            <a:off x="7467441" y="2942632"/>
             <a:ext cx="505836" cy="505836"/>
           </a:xfrm>
           <a:prstGeom prst="rect">
@@ -4888,7 +4894,7 @@
         </p:nvSpPr>
         <p:spPr>
           <a:xfrm>
-            <a:off x="7074838" y="2982862"/>
+            <a:off x="7074838" y="3507960"/>
             <a:ext cx="1313181" cy="430887"/>
           </a:xfrm>
           <a:prstGeom prst="rect">
@@ -4939,7 +4945,7 @@
         </p:nvCxnSpPr>
         <p:spPr>
           <a:xfrm>
-            <a:off x="4833267" y="1793447"/>
+            <a:off x="4833267" y="2318545"/>
             <a:ext cx="0" cy="325348"/>
           </a:xfrm>
           <a:prstGeom prst="straightConnector1">
@@ -4995,7 +5001,7 @@
         </p:blipFill>
         <p:spPr bwMode="white">
           <a:xfrm>
-            <a:off x="2764485" y="4296397"/>
+            <a:off x="2764485" y="4821495"/>
             <a:ext cx="635000" cy="635000"/>
           </a:xfrm>
           <a:prstGeom prst="rect">
@@ -5021,7 +5027,7 @@
         </p:nvSpPr>
         <p:spPr>
           <a:xfrm>
-            <a:off x="2421389" y="4888193"/>
+            <a:off x="2421389" y="5413291"/>
             <a:ext cx="1321196" cy="430887"/>
           </a:xfrm>
           <a:prstGeom prst="rect">
@@ -5074,7 +5080,7 @@
         </p:nvCxnSpPr>
         <p:spPr>
           <a:xfrm rot="5400000" flipH="1" flipV="1">
-            <a:off x="1848596" y="3783212"/>
+            <a:off x="1848596" y="4308310"/>
             <a:ext cx="85203" cy="1746574"/>
           </a:xfrm>
           <a:prstGeom prst="bentConnector4">
@@ -5119,7 +5125,7 @@
         </p:nvCxnSpPr>
         <p:spPr>
           <a:xfrm rot="16200000" flipH="1">
-            <a:off x="2515249" y="3729660"/>
+            <a:off x="2515249" y="4254758"/>
             <a:ext cx="364903" cy="768570"/>
           </a:xfrm>
           <a:prstGeom prst="bentConnector3">
@@ -5162,7 +5168,7 @@
         </p:nvCxnSpPr>
         <p:spPr>
           <a:xfrm rot="5400000">
-            <a:off x="3243672" y="3769808"/>
+            <a:off x="3243672" y="4294906"/>
             <a:ext cx="364903" cy="688275"/>
           </a:xfrm>
           <a:prstGeom prst="bentConnector3">
@@ -5204,7 +5210,7 @@
         </p:nvCxnSpPr>
         <p:spPr>
           <a:xfrm rot="5400000">
-            <a:off x="3656189" y="3166958"/>
+            <a:off x="3656189" y="3692056"/>
             <a:ext cx="1190235" cy="1703642"/>
           </a:xfrm>
           <a:prstGeom prst="bentConnector2">
@@ -5259,7 +5265,7 @@
         </p:blipFill>
         <p:spPr bwMode="white">
           <a:xfrm>
-            <a:off x="5221423" y="1174163"/>
+            <a:off x="5221423" y="1699261"/>
             <a:ext cx="635000" cy="635000"/>
           </a:xfrm>
           <a:prstGeom prst="rect">
@@ -5301,7 +5307,7 @@
         </p:blipFill>
         <p:spPr bwMode="white">
           <a:xfrm>
-            <a:off x="6004709" y="3601033"/>
+            <a:off x="6004709" y="4126131"/>
             <a:ext cx="626506" cy="626506"/>
           </a:xfrm>
           <a:prstGeom prst="rect">
@@ -5327,7 +5333,7 @@
         </p:nvSpPr>
         <p:spPr>
           <a:xfrm>
-            <a:off x="5603919" y="4193234"/>
+            <a:off x="5603919" y="4718332"/>
             <a:ext cx="1452642" cy="600164"/>
           </a:xfrm>
           <a:prstGeom prst="rect">
@@ -5405,7 +5411,7 @@
         </p:blipFill>
         <p:spPr bwMode="white">
           <a:xfrm>
-            <a:off x="8808005" y="2342837"/>
+            <a:off x="8808005" y="2867935"/>
             <a:ext cx="635000" cy="635000"/>
           </a:xfrm>
           <a:prstGeom prst="rect">
@@ -5431,7 +5437,7 @@
         </p:nvSpPr>
         <p:spPr>
           <a:xfrm>
-            <a:off x="8379275" y="2980860"/>
+            <a:off x="8379275" y="3505958"/>
             <a:ext cx="1364477" cy="430887"/>
           </a:xfrm>
           <a:prstGeom prst="rect">
@@ -5496,7 +5502,7 @@
         </p:blipFill>
         <p:spPr bwMode="white">
           <a:xfrm>
-            <a:off x="11646494" y="1111524"/>
+            <a:off x="11646494" y="1636622"/>
             <a:ext cx="280055" cy="280055"/>
           </a:xfrm>
           <a:prstGeom prst="rect">
@@ -5538,7 +5544,7 @@
         </p:blipFill>
         <p:spPr bwMode="white">
           <a:xfrm>
-            <a:off x="2492780" y="1225213"/>
+            <a:off x="2492780" y="1750311"/>
             <a:ext cx="635000" cy="635000"/>
           </a:xfrm>
           <a:prstGeom prst="rect">
@@ -5564,7 +5570,7 @@
         </p:nvSpPr>
         <p:spPr>
           <a:xfrm>
-            <a:off x="10030311" y="2968150"/>
+            <a:off x="10030311" y="3493248"/>
             <a:ext cx="867545" cy="430887"/>
           </a:xfrm>
           <a:prstGeom prst="rect">
@@ -5629,7 +5635,7 @@
         </p:blipFill>
         <p:spPr bwMode="white">
           <a:xfrm>
-            <a:off x="10134641" y="2387417"/>
+            <a:off x="10134641" y="2912515"/>
             <a:ext cx="635000" cy="635000"/>
           </a:xfrm>
           <a:prstGeom prst="rect">
@@ -5655,7 +5661,7 @@
         </p:nvSpPr>
         <p:spPr>
           <a:xfrm>
-            <a:off x="9878138" y="4171885"/>
+            <a:off x="9878138" y="4696983"/>
             <a:ext cx="1170513" cy="430887"/>
           </a:xfrm>
           <a:prstGeom prst="rect">
@@ -5720,7 +5726,7 @@
         </p:blipFill>
         <p:spPr bwMode="white">
           <a:xfrm>
-            <a:off x="10133952" y="3591152"/>
+            <a:off x="10133952" y="4116250"/>
             <a:ext cx="635000" cy="635000"/>
           </a:xfrm>
           <a:prstGeom prst="rect">
@@ -5732,10 +5738,1489 @@
           </a:ln>
         </p:spPr>
       </p:pic>
+      <p:pic>
+        <p:nvPicPr>
+          <p:cNvPr id="110" name="Graphic 109">
+            <a:extLst>
+              <a:ext uri="{FF2B5EF4-FFF2-40B4-BE49-F238E27FC236}">
+                <a16:creationId xmlns:a16="http://schemas.microsoft.com/office/drawing/2014/main" id="{37703208-5F96-A4AC-0B1C-FA88272288E0}"/>
+              </a:ext>
+            </a:extLst>
+          </p:cNvPr>
+          <p:cNvPicPr>
+            <a:picLocks noChangeAspect="1"/>
+          </p:cNvPicPr>
+          <p:nvPr/>
+        </p:nvPicPr>
+        <p:blipFill>
+          <a:blip r:embed="rId32">
+            <a:extLst>
+              <a:ext uri="{96DAC541-7B7A-43D3-8B79-37D633B846F1}">
+                <asvg:svgBlip xmlns:asvg="http://schemas.microsoft.com/office/drawing/2016/SVG/main" r:embed="rId33"/>
+              </a:ext>
+            </a:extLst>
+          </a:blip>
+          <a:stretch>
+            <a:fillRect/>
+          </a:stretch>
+        </p:blipFill>
+        <p:spPr>
+          <a:xfrm>
+            <a:off x="3399485" y="215239"/>
+            <a:ext cx="631843" cy="631843"/>
+          </a:xfrm>
+          <a:prstGeom prst="rect">
+            <a:avLst/>
+          </a:prstGeom>
+        </p:spPr>
+      </p:pic>
+      <p:sp>
+        <p:nvSpPr>
+          <p:cNvPr id="111" name="TextBox 110">
+            <a:extLst>
+              <a:ext uri="{FF2B5EF4-FFF2-40B4-BE49-F238E27FC236}">
+                <a16:creationId xmlns:a16="http://schemas.microsoft.com/office/drawing/2014/main" id="{A75FECCD-FA0A-7A7F-5CE6-C24FC88D0CE5}"/>
+              </a:ext>
+            </a:extLst>
+          </p:cNvPr>
+          <p:cNvSpPr txBox="1"/>
+          <p:nvPr/>
+        </p:nvSpPr>
+        <p:spPr>
+          <a:xfrm>
+            <a:off x="4134938" y="269550"/>
+            <a:ext cx="4123758" cy="523220"/>
+          </a:xfrm>
+          <a:prstGeom prst="rect">
+            <a:avLst/>
+          </a:prstGeom>
+          <a:noFill/>
+        </p:spPr>
+        <p:txBody>
+          <a:bodyPr wrap="none" rtlCol="0">
+            <a:spAutoFit/>
+          </a:bodyPr>
+          <a:lstStyle/>
+          <a:p>
+            <a:r>
+              <a:rPr lang="nb-NO" sz="2800" b="1" dirty="0"/>
+              <a:t>Nostria Infrastructure v1.0</a:t>
+            </a:r>
+          </a:p>
+        </p:txBody>
+      </p:sp>
     </p:spTree>
     <p:extLst>
       <p:ext uri="{BB962C8B-B14F-4D97-AF65-F5344CB8AC3E}">
         <p14:creationId xmlns:p14="http://schemas.microsoft.com/office/powerpoint/2010/main" val="3737241525"/>
+      </p:ext>
+    </p:extLst>
+  </p:cSld>
+  <p:clrMapOvr>
+    <a:masterClrMapping/>
+  </p:clrMapOvr>
+</p:sld>
+</file>
+
+<file path=ppt/slides/slide2.xml><?xml version="1.0" encoding="utf-8"?>
+<p:sld xmlns:a="http://schemas.openxmlformats.org/drawingml/2006/main" xmlns:r="http://schemas.openxmlformats.org/officeDocument/2006/relationships" xmlns:p="http://schemas.openxmlformats.org/presentationml/2006/main">
+  <p:cSld>
+    <p:spTree>
+      <p:nvGrpSpPr>
+        <p:cNvPr id="1" name="">
+          <a:extLst>
+            <a:ext uri="{FF2B5EF4-FFF2-40B4-BE49-F238E27FC236}">
+              <a16:creationId xmlns:a16="http://schemas.microsoft.com/office/drawing/2014/main" id="{B7C047F6-12B7-6C79-08DE-C42F4FF5ED4A}"/>
+            </a:ext>
+          </a:extLst>
+        </p:cNvPr>
+        <p:cNvGrpSpPr/>
+        <p:nvPr/>
+      </p:nvGrpSpPr>
+      <p:grpSpPr>
+        <a:xfrm>
+          <a:off x="0" y="0"/>
+          <a:ext cx="0" cy="0"/>
+          <a:chOff x="0" y="0"/>
+          <a:chExt cx="0" cy="0"/>
+        </a:xfrm>
+      </p:grpSpPr>
+      <p:sp>
+        <p:nvSpPr>
+          <p:cNvPr id="11" name="Rectangle: Rounded Corners 10">
+            <a:extLst>
+              <a:ext uri="{FF2B5EF4-FFF2-40B4-BE49-F238E27FC236}">
+                <a16:creationId xmlns:a16="http://schemas.microsoft.com/office/drawing/2014/main" id="{E5A185D2-3F1A-2927-1B61-99FEAEEF9AE2}"/>
+              </a:ext>
+            </a:extLst>
+          </p:cNvPr>
+          <p:cNvSpPr/>
+          <p:nvPr/>
+        </p:nvSpPr>
+        <p:spPr>
+          <a:xfrm>
+            <a:off x="1915910" y="1385180"/>
+            <a:ext cx="2326928" cy="3195873"/>
+          </a:xfrm>
+          <a:prstGeom prst="roundRect">
+            <a:avLst/>
+          </a:prstGeom>
+          <a:ln>
+            <a:prstDash val="dash"/>
+          </a:ln>
+        </p:spPr>
+        <p:style>
+          <a:lnRef idx="2">
+            <a:schemeClr val="dk1"/>
+          </a:lnRef>
+          <a:fillRef idx="1">
+            <a:schemeClr val="lt1"/>
+          </a:fillRef>
+          <a:effectRef idx="0">
+            <a:schemeClr val="dk1"/>
+          </a:effectRef>
+          <a:fontRef idx="minor">
+            <a:schemeClr val="dk1"/>
+          </a:fontRef>
+        </p:style>
+        <p:txBody>
+          <a:bodyPr rtlCol="0" anchor="ctr"/>
+          <a:lstStyle/>
+          <a:p>
+            <a:pPr algn="ctr"/>
+            <a:endParaRPr lang="nb-NO" dirty="0"/>
+          </a:p>
+        </p:txBody>
+      </p:sp>
+      <p:sp>
+        <p:nvSpPr>
+          <p:cNvPr id="6" name="Rectangle: Rounded Corners 5">
+            <a:extLst>
+              <a:ext uri="{FF2B5EF4-FFF2-40B4-BE49-F238E27FC236}">
+                <a16:creationId xmlns:a16="http://schemas.microsoft.com/office/drawing/2014/main" id="{2F4ECC7D-1DD1-4D16-4F3F-95E1D1DA9E77}"/>
+              </a:ext>
+            </a:extLst>
+          </p:cNvPr>
+          <p:cNvSpPr/>
+          <p:nvPr/>
+        </p:nvSpPr>
+        <p:spPr>
+          <a:xfrm>
+            <a:off x="6151633" y="4710183"/>
+            <a:ext cx="1563028" cy="742347"/>
+          </a:xfrm>
+          <a:prstGeom prst="roundRect">
+            <a:avLst/>
+          </a:prstGeom>
+          <a:ln>
+            <a:prstDash val="dash"/>
+          </a:ln>
+        </p:spPr>
+        <p:style>
+          <a:lnRef idx="2">
+            <a:schemeClr val="dk1"/>
+          </a:lnRef>
+          <a:fillRef idx="1">
+            <a:schemeClr val="lt1"/>
+          </a:fillRef>
+          <a:effectRef idx="0">
+            <a:schemeClr val="dk1"/>
+          </a:effectRef>
+          <a:fontRef idx="minor">
+            <a:schemeClr val="dk1"/>
+          </a:fontRef>
+        </p:style>
+        <p:txBody>
+          <a:bodyPr rtlCol="0" anchor="ctr"/>
+          <a:lstStyle/>
+          <a:p>
+            <a:pPr algn="ctr"/>
+            <a:endParaRPr lang="nb-NO" dirty="0"/>
+          </a:p>
+        </p:txBody>
+      </p:sp>
+      <p:pic>
+        <p:nvPicPr>
+          <p:cNvPr id="15" name="Graphic 14">
+            <a:extLst>
+              <a:ext uri="{FF2B5EF4-FFF2-40B4-BE49-F238E27FC236}">
+                <a16:creationId xmlns:a16="http://schemas.microsoft.com/office/drawing/2014/main" id="{8E740773-C6FC-C109-FC4C-547DCCA93C0D}"/>
+              </a:ext>
+            </a:extLst>
+          </p:cNvPr>
+          <p:cNvPicPr>
+            <a:picLocks noChangeAspect="1"/>
+          </p:cNvPicPr>
+          <p:nvPr/>
+        </p:nvPicPr>
+        <p:blipFill>
+          <a:blip r:embed="rId2">
+            <a:lum/>
+            <a:extLst>
+              <a:ext uri="{96DAC541-7B7A-43D3-8B79-37D633B846F1}">
+                <asvg:svgBlip xmlns:asvg="http://schemas.microsoft.com/office/drawing/2016/SVG/main" r:embed="rId3"/>
+              </a:ext>
+            </a:extLst>
+          </a:blip>
+          <a:srcRect/>
+          <a:stretch>
+            <a:fillRect/>
+          </a:stretch>
+        </p:blipFill>
+        <p:spPr bwMode="white">
+          <a:xfrm>
+            <a:off x="5133693" y="1467513"/>
+            <a:ext cx="635000" cy="635000"/>
+          </a:xfrm>
+          <a:prstGeom prst="rect">
+            <a:avLst/>
+          </a:prstGeom>
+          <a:ln>
+            <a:headEnd type="none"/>
+            <a:tailEnd type="none"/>
+          </a:ln>
+        </p:spPr>
+      </p:pic>
+      <p:sp>
+        <p:nvSpPr>
+          <p:cNvPr id="16" name="TextBox 15">
+            <a:extLst>
+              <a:ext uri="{FF2B5EF4-FFF2-40B4-BE49-F238E27FC236}">
+                <a16:creationId xmlns:a16="http://schemas.microsoft.com/office/drawing/2014/main" id="{EA9523D6-358D-D4C0-2114-04DF99A108CE}"/>
+              </a:ext>
+            </a:extLst>
+          </p:cNvPr>
+          <p:cNvSpPr txBox="1"/>
+          <p:nvPr/>
+        </p:nvSpPr>
+        <p:spPr>
+          <a:xfrm>
+            <a:off x="4746513" y="2027516"/>
+            <a:ext cx="1409360" cy="430887"/>
+          </a:xfrm>
+          <a:prstGeom prst="rect">
+            <a:avLst/>
+          </a:prstGeom>
+          <a:noFill/>
+        </p:spPr>
+        <p:txBody>
+          <a:bodyPr wrap="none" rtlCol="0">
+            <a:spAutoFit/>
+          </a:bodyPr>
+          <a:lstStyle/>
+          <a:p>
+            <a:pPr algn="ctr"/>
+            <a:r>
+              <a:rPr lang="nb-NO" sz="1100" dirty="0"/>
+              <a:t>Discovery Relay</a:t>
+            </a:r>
+          </a:p>
+          <a:p>
+            <a:pPr algn="ctr"/>
+            <a:r>
+              <a:rPr lang="nb-NO" sz="1100" dirty="0">
+                <a:solidFill>
+                  <a:schemeClr val="bg2">
+                    <a:lumMod val="50000"/>
+                  </a:schemeClr>
+                </a:solidFill>
+              </a:rPr>
+              <a:t>discovery.nostria.app</a:t>
+            </a:r>
+          </a:p>
+        </p:txBody>
+      </p:sp>
+      <p:pic>
+        <p:nvPicPr>
+          <p:cNvPr id="22" name="Graphic 21">
+            <a:extLst>
+              <a:ext uri="{FF2B5EF4-FFF2-40B4-BE49-F238E27FC236}">
+                <a16:creationId xmlns:a16="http://schemas.microsoft.com/office/drawing/2014/main" id="{7DA475A8-A735-60DB-DCCC-89FDDB8E789F}"/>
+              </a:ext>
+            </a:extLst>
+          </p:cNvPr>
+          <p:cNvPicPr>
+            <a:picLocks noChangeAspect="1"/>
+          </p:cNvPicPr>
+          <p:nvPr/>
+        </p:nvPicPr>
+        <p:blipFill>
+          <a:blip r:embed="rId4">
+            <a:lum/>
+            <a:extLst>
+              <a:ext uri="{96DAC541-7B7A-43D3-8B79-37D633B846F1}">
+                <asvg:svgBlip xmlns:asvg="http://schemas.microsoft.com/office/drawing/2016/SVG/main" r:embed="rId5"/>
+              </a:ext>
+            </a:extLst>
+          </a:blip>
+          <a:srcRect/>
+          <a:stretch>
+            <a:fillRect/>
+          </a:stretch>
+        </p:blipFill>
+        <p:spPr bwMode="white">
+          <a:xfrm>
+            <a:off x="2764485" y="1518298"/>
+            <a:ext cx="635000" cy="635000"/>
+          </a:xfrm>
+          <a:prstGeom prst="rect">
+            <a:avLst/>
+          </a:prstGeom>
+          <a:ln>
+            <a:headEnd type="none"/>
+            <a:tailEnd type="none"/>
+          </a:ln>
+        </p:spPr>
+      </p:pic>
+      <p:sp>
+        <p:nvSpPr>
+          <p:cNvPr id="29" name="TextBox 28">
+            <a:extLst>
+              <a:ext uri="{FF2B5EF4-FFF2-40B4-BE49-F238E27FC236}">
+                <a16:creationId xmlns:a16="http://schemas.microsoft.com/office/drawing/2014/main" id="{0FD4DF38-E43B-D2AA-41CE-95F6FF7E34B4}"/>
+              </a:ext>
+            </a:extLst>
+          </p:cNvPr>
+          <p:cNvSpPr txBox="1"/>
+          <p:nvPr/>
+        </p:nvSpPr>
+        <p:spPr>
+          <a:xfrm>
+            <a:off x="3092162" y="3524182"/>
+            <a:ext cx="1096774" cy="938719"/>
+          </a:xfrm>
+          <a:prstGeom prst="rect">
+            <a:avLst/>
+          </a:prstGeom>
+          <a:noFill/>
+        </p:spPr>
+        <p:txBody>
+          <a:bodyPr wrap="none" rtlCol="0">
+            <a:spAutoFit/>
+          </a:bodyPr>
+          <a:lstStyle/>
+          <a:p>
+            <a:pPr algn="ctr"/>
+            <a:r>
+              <a:rPr lang="nb-NO" sz="1100" dirty="0"/>
+              <a:t>User Relays</a:t>
+            </a:r>
+          </a:p>
+          <a:p>
+            <a:pPr algn="ctr"/>
+            <a:r>
+              <a:rPr lang="nb-NO" sz="1100" dirty="0">
+                <a:solidFill>
+                  <a:schemeClr val="bg2">
+                    <a:lumMod val="50000"/>
+                  </a:schemeClr>
+                </a:solidFill>
+              </a:rPr>
+              <a:t>ribo.nostria.app</a:t>
+            </a:r>
+          </a:p>
+          <a:p>
+            <a:pPr algn="ctr"/>
+            <a:r>
+              <a:rPr lang="nb-NO" sz="1100" dirty="0">
+                <a:solidFill>
+                  <a:schemeClr val="bg2">
+                    <a:lumMod val="50000"/>
+                  </a:schemeClr>
+                </a:solidFill>
+              </a:rPr>
+              <a:t>rilo.nostria.app</a:t>
+            </a:r>
+          </a:p>
+          <a:p>
+            <a:pPr algn="ctr"/>
+            <a:r>
+              <a:rPr lang="nb-NO" sz="1100" dirty="0">
+                <a:solidFill>
+                  <a:schemeClr val="bg2">
+                    <a:lumMod val="50000"/>
+                  </a:schemeClr>
+                </a:solidFill>
+              </a:rPr>
+              <a:t>rifu.nostria.app</a:t>
+            </a:r>
+          </a:p>
+          <a:p>
+            <a:pPr algn="ctr"/>
+            <a:r>
+              <a:rPr lang="nb-NO" sz="1100" dirty="0">
+                <a:solidFill>
+                  <a:schemeClr val="bg2">
+                    <a:lumMod val="50000"/>
+                  </a:schemeClr>
+                </a:solidFill>
+              </a:rPr>
+              <a:t>...</a:t>
+            </a:r>
+          </a:p>
+        </p:txBody>
+      </p:sp>
+      <p:pic>
+        <p:nvPicPr>
+          <p:cNvPr id="30" name="Graphic 29">
+            <a:extLst>
+              <a:ext uri="{FF2B5EF4-FFF2-40B4-BE49-F238E27FC236}">
+                <a16:creationId xmlns:a16="http://schemas.microsoft.com/office/drawing/2014/main" id="{6D6F7EFA-F708-134F-79F3-91C6A03292AB}"/>
+              </a:ext>
+            </a:extLst>
+          </p:cNvPr>
+          <p:cNvPicPr>
+            <a:picLocks noChangeAspect="1"/>
+          </p:cNvPicPr>
+          <p:nvPr/>
+        </p:nvPicPr>
+        <p:blipFill>
+          <a:blip r:embed="rId6">
+            <a:lum/>
+            <a:extLst>
+              <a:ext uri="{96DAC541-7B7A-43D3-8B79-37D633B846F1}">
+                <asvg:svgBlip xmlns:asvg="http://schemas.microsoft.com/office/drawing/2016/SVG/main" r:embed="rId7"/>
+              </a:ext>
+            </a:extLst>
+          </a:blip>
+          <a:srcRect/>
+          <a:stretch>
+            <a:fillRect/>
+          </a:stretch>
+        </p:blipFill>
+        <p:spPr bwMode="white">
+          <a:xfrm>
+            <a:off x="2223589" y="2963350"/>
+            <a:ext cx="635000" cy="635000"/>
+          </a:xfrm>
+          <a:prstGeom prst="rect">
+            <a:avLst/>
+          </a:prstGeom>
+          <a:ln>
+            <a:headEnd type="none"/>
+            <a:tailEnd type="none"/>
+          </a:ln>
+        </p:spPr>
+      </p:pic>
+      <p:sp>
+        <p:nvSpPr>
+          <p:cNvPr id="32" name="TextBox 31">
+            <a:extLst>
+              <a:ext uri="{FF2B5EF4-FFF2-40B4-BE49-F238E27FC236}">
+                <a16:creationId xmlns:a16="http://schemas.microsoft.com/office/drawing/2014/main" id="{71946816-5BA9-471E-D7A8-C19705837435}"/>
+              </a:ext>
+            </a:extLst>
+          </p:cNvPr>
+          <p:cNvSpPr txBox="1"/>
+          <p:nvPr/>
+        </p:nvSpPr>
+        <p:spPr>
+          <a:xfrm>
+            <a:off x="1961443" y="3503397"/>
+            <a:ext cx="1159292" cy="938719"/>
+          </a:xfrm>
+          <a:prstGeom prst="rect">
+            <a:avLst/>
+          </a:prstGeom>
+          <a:noFill/>
+        </p:spPr>
+        <p:txBody>
+          <a:bodyPr wrap="none" rtlCol="0">
+            <a:spAutoFit/>
+          </a:bodyPr>
+          <a:lstStyle/>
+          <a:p>
+            <a:pPr algn="ctr"/>
+            <a:r>
+              <a:rPr lang="nb-NO" sz="1100" dirty="0"/>
+              <a:t>Media Servers</a:t>
+            </a:r>
+          </a:p>
+          <a:p>
+            <a:pPr algn="ctr"/>
+            <a:r>
+              <a:rPr lang="nb-NO" sz="1100" dirty="0">
+                <a:solidFill>
+                  <a:schemeClr val="bg2">
+                    <a:lumMod val="50000"/>
+                  </a:schemeClr>
+                </a:solidFill>
+              </a:rPr>
+              <a:t>mibo.nostria.app</a:t>
+            </a:r>
+          </a:p>
+          <a:p>
+            <a:pPr algn="ctr"/>
+            <a:r>
+              <a:rPr lang="nb-NO" sz="1100" dirty="0">
+                <a:solidFill>
+                  <a:schemeClr val="bg2">
+                    <a:lumMod val="50000"/>
+                  </a:schemeClr>
+                </a:solidFill>
+              </a:rPr>
+              <a:t>milo.nostria.app</a:t>
+            </a:r>
+          </a:p>
+          <a:p>
+            <a:pPr algn="ctr"/>
+            <a:r>
+              <a:rPr lang="nb-NO" sz="1100" dirty="0">
+                <a:solidFill>
+                  <a:schemeClr val="bg2">
+                    <a:lumMod val="50000"/>
+                  </a:schemeClr>
+                </a:solidFill>
+              </a:rPr>
+              <a:t>mifu.nostria.app</a:t>
+            </a:r>
+          </a:p>
+          <a:p>
+            <a:pPr algn="ctr"/>
+            <a:r>
+              <a:rPr lang="nb-NO" sz="1100" dirty="0">
+                <a:solidFill>
+                  <a:schemeClr val="bg2">
+                    <a:lumMod val="50000"/>
+                  </a:schemeClr>
+                </a:solidFill>
+              </a:rPr>
+              <a:t>...</a:t>
+            </a:r>
+          </a:p>
+        </p:txBody>
+      </p:sp>
+      <p:pic>
+        <p:nvPicPr>
+          <p:cNvPr id="33" name="Graphic 32">
+            <a:extLst>
+              <a:ext uri="{FF2B5EF4-FFF2-40B4-BE49-F238E27FC236}">
+                <a16:creationId xmlns:a16="http://schemas.microsoft.com/office/drawing/2014/main" id="{119D3701-4BBB-9698-00C5-3DD030D18089}"/>
+              </a:ext>
+            </a:extLst>
+          </p:cNvPr>
+          <p:cNvPicPr>
+            <a:picLocks noChangeAspect="1"/>
+          </p:cNvPicPr>
+          <p:nvPr/>
+        </p:nvPicPr>
+        <p:blipFill>
+          <a:blip r:embed="rId6">
+            <a:lum/>
+            <a:extLst>
+              <a:ext uri="{96DAC541-7B7A-43D3-8B79-37D633B846F1}">
+                <asvg:svgBlip xmlns:asvg="http://schemas.microsoft.com/office/drawing/2016/SVG/main" r:embed="rId7"/>
+              </a:ext>
+            </a:extLst>
+          </a:blip>
+          <a:srcRect/>
+          <a:stretch>
+            <a:fillRect/>
+          </a:stretch>
+        </p:blipFill>
+        <p:spPr bwMode="white">
+          <a:xfrm>
+            <a:off x="3338372" y="2993176"/>
+            <a:ext cx="635000" cy="635000"/>
+          </a:xfrm>
+          <a:prstGeom prst="rect">
+            <a:avLst/>
+          </a:prstGeom>
+          <a:ln>
+            <a:headEnd type="none"/>
+            <a:tailEnd type="none"/>
+          </a:ln>
+        </p:spPr>
+      </p:pic>
+      <p:pic>
+        <p:nvPicPr>
+          <p:cNvPr id="34" name="Graphic 33">
+            <a:extLst>
+              <a:ext uri="{FF2B5EF4-FFF2-40B4-BE49-F238E27FC236}">
+                <a16:creationId xmlns:a16="http://schemas.microsoft.com/office/drawing/2014/main" id="{79F89F3A-C95B-E2DB-D0FA-7F1ADB0F5798}"/>
+              </a:ext>
+            </a:extLst>
+          </p:cNvPr>
+          <p:cNvPicPr>
+            <a:picLocks noChangeAspect="1"/>
+          </p:cNvPicPr>
+          <p:nvPr/>
+        </p:nvPicPr>
+        <p:blipFill>
+          <a:blip r:embed="rId6">
+            <a:lum/>
+            <a:extLst>
+              <a:ext uri="{96DAC541-7B7A-43D3-8B79-37D633B846F1}">
+                <asvg:svgBlip xmlns:asvg="http://schemas.microsoft.com/office/drawing/2016/SVG/main" r:embed="rId7"/>
+              </a:ext>
+            </a:extLst>
+          </a:blip>
+          <a:srcRect/>
+          <a:stretch>
+            <a:fillRect/>
+          </a:stretch>
+        </p:blipFill>
+        <p:spPr bwMode="white">
+          <a:xfrm>
+            <a:off x="7259651" y="4771092"/>
+            <a:ext cx="317500" cy="317500"/>
+          </a:xfrm>
+          <a:prstGeom prst="rect">
+            <a:avLst/>
+          </a:prstGeom>
+          <a:ln>
+            <a:headEnd type="none"/>
+            <a:tailEnd type="none"/>
+          </a:ln>
+        </p:spPr>
+      </p:pic>
+      <p:pic>
+        <p:nvPicPr>
+          <p:cNvPr id="35" name="Graphic 34">
+            <a:extLst>
+              <a:ext uri="{FF2B5EF4-FFF2-40B4-BE49-F238E27FC236}">
+                <a16:creationId xmlns:a16="http://schemas.microsoft.com/office/drawing/2014/main" id="{778DE81E-AE59-404E-C0D4-F632941CD2A7}"/>
+              </a:ext>
+            </a:extLst>
+          </p:cNvPr>
+          <p:cNvPicPr>
+            <a:picLocks noChangeAspect="1"/>
+          </p:cNvPicPr>
+          <p:nvPr/>
+        </p:nvPicPr>
+        <p:blipFill>
+          <a:blip r:embed="rId6">
+            <a:lum/>
+            <a:extLst>
+              <a:ext uri="{96DAC541-7B7A-43D3-8B79-37D633B846F1}">
+                <asvg:svgBlip xmlns:asvg="http://schemas.microsoft.com/office/drawing/2016/SVG/main" r:embed="rId7"/>
+              </a:ext>
+            </a:extLst>
+          </a:blip>
+          <a:srcRect/>
+          <a:stretch>
+            <a:fillRect/>
+          </a:stretch>
+        </p:blipFill>
+        <p:spPr bwMode="white">
+          <a:xfrm>
+            <a:off x="7259578" y="5080574"/>
+            <a:ext cx="317500" cy="317500"/>
+          </a:xfrm>
+          <a:prstGeom prst="rect">
+            <a:avLst/>
+          </a:prstGeom>
+          <a:ln>
+            <a:headEnd type="none"/>
+            <a:tailEnd type="none"/>
+          </a:ln>
+        </p:spPr>
+      </p:pic>
+      <p:pic>
+        <p:nvPicPr>
+          <p:cNvPr id="36" name="Graphic 35">
+            <a:extLst>
+              <a:ext uri="{FF2B5EF4-FFF2-40B4-BE49-F238E27FC236}">
+                <a16:creationId xmlns:a16="http://schemas.microsoft.com/office/drawing/2014/main" id="{17381ED4-7749-4A0D-3DB5-6B18EA9EA62A}"/>
+              </a:ext>
+            </a:extLst>
+          </p:cNvPr>
+          <p:cNvPicPr>
+            <a:picLocks noChangeAspect="1"/>
+          </p:cNvPicPr>
+          <p:nvPr/>
+        </p:nvPicPr>
+        <p:blipFill>
+          <a:blip r:embed="rId6">
+            <a:lum/>
+            <a:extLst>
+              <a:ext uri="{96DAC541-7B7A-43D3-8B79-37D633B846F1}">
+                <asvg:svgBlip xmlns:asvg="http://schemas.microsoft.com/office/drawing/2016/SVG/main" r:embed="rId7"/>
+              </a:ext>
+            </a:extLst>
+          </a:blip>
+          <a:srcRect/>
+          <a:stretch>
+            <a:fillRect/>
+          </a:stretch>
+        </p:blipFill>
+        <p:spPr bwMode="white">
+          <a:xfrm>
+            <a:off x="6812090" y="4753007"/>
+            <a:ext cx="317500" cy="317500"/>
+          </a:xfrm>
+          <a:prstGeom prst="rect">
+            <a:avLst/>
+          </a:prstGeom>
+          <a:ln>
+            <a:headEnd type="none"/>
+            <a:tailEnd type="none"/>
+          </a:ln>
+        </p:spPr>
+      </p:pic>
+      <p:pic>
+        <p:nvPicPr>
+          <p:cNvPr id="37" name="Graphic 36">
+            <a:extLst>
+              <a:ext uri="{FF2B5EF4-FFF2-40B4-BE49-F238E27FC236}">
+                <a16:creationId xmlns:a16="http://schemas.microsoft.com/office/drawing/2014/main" id="{1744093A-6E5E-77A4-E4F6-923184A613CC}"/>
+              </a:ext>
+            </a:extLst>
+          </p:cNvPr>
+          <p:cNvPicPr>
+            <a:picLocks noChangeAspect="1"/>
+          </p:cNvPicPr>
+          <p:nvPr/>
+        </p:nvPicPr>
+        <p:blipFill>
+          <a:blip r:embed="rId6">
+            <a:lum/>
+            <a:extLst>
+              <a:ext uri="{96DAC541-7B7A-43D3-8B79-37D633B846F1}">
+                <asvg:svgBlip xmlns:asvg="http://schemas.microsoft.com/office/drawing/2016/SVG/main" r:embed="rId7"/>
+              </a:ext>
+            </a:extLst>
+          </a:blip>
+          <a:srcRect/>
+          <a:stretch>
+            <a:fillRect/>
+          </a:stretch>
+        </p:blipFill>
+        <p:spPr bwMode="white">
+          <a:xfrm>
+            <a:off x="6830990" y="5056370"/>
+            <a:ext cx="317500" cy="317500"/>
+          </a:xfrm>
+          <a:prstGeom prst="rect">
+            <a:avLst/>
+          </a:prstGeom>
+          <a:ln>
+            <a:headEnd type="none"/>
+            <a:tailEnd type="none"/>
+          </a:ln>
+        </p:spPr>
+      </p:pic>
+      <p:pic>
+        <p:nvPicPr>
+          <p:cNvPr id="110" name="Graphic 109">
+            <a:extLst>
+              <a:ext uri="{FF2B5EF4-FFF2-40B4-BE49-F238E27FC236}">
+                <a16:creationId xmlns:a16="http://schemas.microsoft.com/office/drawing/2014/main" id="{9215E189-B434-2E09-1B73-7E8CF7F885A9}"/>
+              </a:ext>
+            </a:extLst>
+          </p:cNvPr>
+          <p:cNvPicPr>
+            <a:picLocks noChangeAspect="1"/>
+          </p:cNvPicPr>
+          <p:nvPr/>
+        </p:nvPicPr>
+        <p:blipFill>
+          <a:blip r:embed="rId8">
+            <a:extLst>
+              <a:ext uri="{96DAC541-7B7A-43D3-8B79-37D633B846F1}">
+                <asvg:svgBlip xmlns:asvg="http://schemas.microsoft.com/office/drawing/2016/SVG/main" r:embed="rId9"/>
+              </a:ext>
+            </a:extLst>
+          </a:blip>
+          <a:stretch>
+            <a:fillRect/>
+          </a:stretch>
+        </p:blipFill>
+        <p:spPr>
+          <a:xfrm>
+            <a:off x="3399485" y="215239"/>
+            <a:ext cx="631843" cy="631843"/>
+          </a:xfrm>
+          <a:prstGeom prst="rect">
+            <a:avLst/>
+          </a:prstGeom>
+        </p:spPr>
+      </p:pic>
+      <p:sp>
+        <p:nvSpPr>
+          <p:cNvPr id="111" name="TextBox 110">
+            <a:extLst>
+              <a:ext uri="{FF2B5EF4-FFF2-40B4-BE49-F238E27FC236}">
+                <a16:creationId xmlns:a16="http://schemas.microsoft.com/office/drawing/2014/main" id="{5BF055A7-8A45-E95C-3695-C0A8FC23AECD}"/>
+              </a:ext>
+            </a:extLst>
+          </p:cNvPr>
+          <p:cNvSpPr txBox="1"/>
+          <p:nvPr/>
+        </p:nvSpPr>
+        <p:spPr>
+          <a:xfrm>
+            <a:off x="4134938" y="269550"/>
+            <a:ext cx="3914983" cy="523220"/>
+          </a:xfrm>
+          <a:prstGeom prst="rect">
+            <a:avLst/>
+          </a:prstGeom>
+          <a:noFill/>
+        </p:spPr>
+        <p:txBody>
+          <a:bodyPr wrap="none" rtlCol="0">
+            <a:spAutoFit/>
+          </a:bodyPr>
+          <a:lstStyle/>
+          <a:p>
+            <a:r>
+              <a:rPr lang="nb-NO" sz="2800" b="1" dirty="0"/>
+              <a:t>Nostria Architecture v1.0</a:t>
+            </a:r>
+          </a:p>
+        </p:txBody>
+      </p:sp>
+      <p:sp>
+        <p:nvSpPr>
+          <p:cNvPr id="9" name="TextBox 8">
+            <a:extLst>
+              <a:ext uri="{FF2B5EF4-FFF2-40B4-BE49-F238E27FC236}">
+                <a16:creationId xmlns:a16="http://schemas.microsoft.com/office/drawing/2014/main" id="{DBE24D3C-D9F0-7686-FCA4-96F302F070AD}"/>
+              </a:ext>
+            </a:extLst>
+          </p:cNvPr>
+          <p:cNvSpPr txBox="1"/>
+          <p:nvPr/>
+        </p:nvSpPr>
+        <p:spPr>
+          <a:xfrm>
+            <a:off x="2269104" y="2175236"/>
+            <a:ext cx="1625766" cy="769441"/>
+          </a:xfrm>
+          <a:prstGeom prst="rect">
+            <a:avLst/>
+          </a:prstGeom>
+          <a:noFill/>
+        </p:spPr>
+        <p:txBody>
+          <a:bodyPr wrap="none" rtlCol="0">
+            <a:spAutoFit/>
+          </a:bodyPr>
+          <a:lstStyle/>
+          <a:p>
+            <a:pPr algn="ctr"/>
+            <a:r>
+              <a:rPr lang="nb-NO" sz="1100" dirty="0"/>
+              <a:t>Nostria User</a:t>
+            </a:r>
+          </a:p>
+          <a:p>
+            <a:pPr algn="ctr"/>
+            <a:r>
+              <a:rPr lang="nb-NO" sz="1100" dirty="0">
+                <a:solidFill>
+                  <a:schemeClr val="bg2">
+                    <a:lumMod val="50000"/>
+                  </a:schemeClr>
+                </a:solidFill>
+              </a:rPr>
+              <a:t>When signing up, users is</a:t>
+            </a:r>
+          </a:p>
+          <a:p>
+            <a:pPr algn="ctr"/>
+            <a:r>
+              <a:rPr lang="nb-NO" sz="1100" dirty="0">
+                <a:solidFill>
+                  <a:schemeClr val="bg2">
+                    <a:lumMod val="50000"/>
+                  </a:schemeClr>
+                </a:solidFill>
+              </a:rPr>
+              <a:t>assigned user relay</a:t>
+            </a:r>
+          </a:p>
+          <a:p>
+            <a:pPr algn="ctr"/>
+            <a:r>
+              <a:rPr lang="nb-NO" sz="1100" dirty="0">
+                <a:solidFill>
+                  <a:schemeClr val="bg2">
+                    <a:lumMod val="50000"/>
+                  </a:schemeClr>
+                </a:solidFill>
+              </a:rPr>
+              <a:t>and media server</a:t>
+            </a:r>
+          </a:p>
+        </p:txBody>
+      </p:sp>
+      <p:sp>
+        <p:nvSpPr>
+          <p:cNvPr id="19" name="TextBox 18">
+            <a:extLst>
+              <a:ext uri="{FF2B5EF4-FFF2-40B4-BE49-F238E27FC236}">
+                <a16:creationId xmlns:a16="http://schemas.microsoft.com/office/drawing/2014/main" id="{1092C501-C086-E0A6-E052-B4CA94B22934}"/>
+              </a:ext>
+            </a:extLst>
+          </p:cNvPr>
+          <p:cNvSpPr txBox="1"/>
+          <p:nvPr/>
+        </p:nvSpPr>
+        <p:spPr>
+          <a:xfrm>
+            <a:off x="6155873" y="1579105"/>
+            <a:ext cx="4007094" cy="769441"/>
+          </a:xfrm>
+          <a:prstGeom prst="rect">
+            <a:avLst/>
+          </a:prstGeom>
+          <a:noFill/>
+        </p:spPr>
+        <p:txBody>
+          <a:bodyPr wrap="square" rtlCol="0">
+            <a:spAutoFit/>
+          </a:bodyPr>
+          <a:lstStyle/>
+          <a:p>
+            <a:r>
+              <a:rPr lang="nb-NO" sz="1100" dirty="0"/>
+              <a:t>1. Discovery of users</a:t>
+            </a:r>
+          </a:p>
+          <a:p>
+            <a:r>
+              <a:rPr lang="nb-NO" sz="1100" dirty="0">
+                <a:solidFill>
+                  <a:schemeClr val="bg2">
+                    <a:lumMod val="50000"/>
+                  </a:schemeClr>
+                </a:solidFill>
+              </a:rPr>
+              <a:t>When looking up a user on Nostria, a request is sent to the Discovery Relay to find the User Relays. The Discovery relay holds a global list of all Nostr users, not just Nostria users.</a:t>
+            </a:r>
+          </a:p>
+        </p:txBody>
+      </p:sp>
+      <p:sp>
+        <p:nvSpPr>
+          <p:cNvPr id="24" name="TextBox 23">
+            <a:extLst>
+              <a:ext uri="{FF2B5EF4-FFF2-40B4-BE49-F238E27FC236}">
+                <a16:creationId xmlns:a16="http://schemas.microsoft.com/office/drawing/2014/main" id="{0079A2CC-6BC4-D707-FDA8-D43841660DE7}"/>
+              </a:ext>
+            </a:extLst>
+          </p:cNvPr>
+          <p:cNvSpPr txBox="1"/>
+          <p:nvPr/>
+        </p:nvSpPr>
+        <p:spPr>
+          <a:xfrm>
+            <a:off x="6151633" y="3511232"/>
+            <a:ext cx="4007094" cy="1107996"/>
+          </a:xfrm>
+          <a:prstGeom prst="rect">
+            <a:avLst/>
+          </a:prstGeom>
+          <a:noFill/>
+        </p:spPr>
+        <p:txBody>
+          <a:bodyPr wrap="square" rtlCol="0">
+            <a:spAutoFit/>
+          </a:bodyPr>
+          <a:lstStyle/>
+          <a:p>
+            <a:r>
+              <a:rPr lang="nb-NO" sz="1100" dirty="0"/>
+              <a:t>3. Interacting with users</a:t>
+            </a:r>
+          </a:p>
+          <a:p>
+            <a:r>
+              <a:rPr lang="nb-NO" sz="1100" dirty="0">
+                <a:solidFill>
+                  <a:schemeClr val="bg2">
+                    <a:lumMod val="50000"/>
+                  </a:schemeClr>
+                </a:solidFill>
+              </a:rPr>
+              <a:t>When Nostria user’s interact with other users, commenting on their posts, send direct messages or join group chats, Nostria will publish events both to the receivers and the the current user’s relays. This ensures the user always has a full set of their data, accessible on their user relays.</a:t>
+            </a:r>
+          </a:p>
+        </p:txBody>
+      </p:sp>
+      <p:pic>
+        <p:nvPicPr>
+          <p:cNvPr id="25" name="Graphic 24">
+            <a:extLst>
+              <a:ext uri="{FF2B5EF4-FFF2-40B4-BE49-F238E27FC236}">
+                <a16:creationId xmlns:a16="http://schemas.microsoft.com/office/drawing/2014/main" id="{47C98919-C330-D750-AAD0-FA67DF084A13}"/>
+              </a:ext>
+            </a:extLst>
+          </p:cNvPr>
+          <p:cNvPicPr>
+            <a:picLocks noChangeAspect="1"/>
+          </p:cNvPicPr>
+          <p:nvPr/>
+        </p:nvPicPr>
+        <p:blipFill>
+          <a:blip r:embed="rId4">
+            <a:lum/>
+            <a:extLst>
+              <a:ext uri="{96DAC541-7B7A-43D3-8B79-37D633B846F1}">
+                <asvg:svgBlip xmlns:asvg="http://schemas.microsoft.com/office/drawing/2016/SVG/main" r:embed="rId5"/>
+              </a:ext>
+            </a:extLst>
+          </a:blip>
+          <a:srcRect/>
+          <a:stretch>
+            <a:fillRect/>
+          </a:stretch>
+        </p:blipFill>
+        <p:spPr bwMode="white">
+          <a:xfrm>
+            <a:off x="6254322" y="4784737"/>
+            <a:ext cx="542004" cy="542004"/>
+          </a:xfrm>
+          <a:prstGeom prst="rect">
+            <a:avLst/>
+          </a:prstGeom>
+          <a:ln>
+            <a:headEnd type="none"/>
+            <a:tailEnd type="none"/>
+          </a:ln>
+        </p:spPr>
+      </p:pic>
+      <p:sp>
+        <p:nvSpPr>
+          <p:cNvPr id="26" name="Rectangle: Rounded Corners 25">
+            <a:extLst>
+              <a:ext uri="{FF2B5EF4-FFF2-40B4-BE49-F238E27FC236}">
+                <a16:creationId xmlns:a16="http://schemas.microsoft.com/office/drawing/2014/main" id="{4B121327-1D1B-04EF-AE85-74F50D923001}"/>
+              </a:ext>
+            </a:extLst>
+          </p:cNvPr>
+          <p:cNvSpPr/>
+          <p:nvPr/>
+        </p:nvSpPr>
+        <p:spPr>
+          <a:xfrm>
+            <a:off x="6167397" y="5562224"/>
+            <a:ext cx="1563028" cy="742347"/>
+          </a:xfrm>
+          <a:prstGeom prst="roundRect">
+            <a:avLst/>
+          </a:prstGeom>
+          <a:ln>
+            <a:prstDash val="dash"/>
+          </a:ln>
+        </p:spPr>
+        <p:style>
+          <a:lnRef idx="2">
+            <a:schemeClr val="dk1"/>
+          </a:lnRef>
+          <a:fillRef idx="1">
+            <a:schemeClr val="lt1"/>
+          </a:fillRef>
+          <a:effectRef idx="0">
+            <a:schemeClr val="dk1"/>
+          </a:effectRef>
+          <a:fontRef idx="minor">
+            <a:schemeClr val="dk1"/>
+          </a:fontRef>
+        </p:style>
+        <p:txBody>
+          <a:bodyPr rtlCol="0" anchor="ctr"/>
+          <a:lstStyle/>
+          <a:p>
+            <a:pPr algn="ctr"/>
+            <a:endParaRPr lang="nb-NO" dirty="0"/>
+          </a:p>
+        </p:txBody>
+      </p:sp>
+      <p:pic>
+        <p:nvPicPr>
+          <p:cNvPr id="27" name="Graphic 26">
+            <a:extLst>
+              <a:ext uri="{FF2B5EF4-FFF2-40B4-BE49-F238E27FC236}">
+                <a16:creationId xmlns:a16="http://schemas.microsoft.com/office/drawing/2014/main" id="{B7292FE3-4613-160E-4C22-314525B45B44}"/>
+              </a:ext>
+            </a:extLst>
+          </p:cNvPr>
+          <p:cNvPicPr>
+            <a:picLocks noChangeAspect="1"/>
+          </p:cNvPicPr>
+          <p:nvPr/>
+        </p:nvPicPr>
+        <p:blipFill>
+          <a:blip r:embed="rId6">
+            <a:lum/>
+            <a:extLst>
+              <a:ext uri="{96DAC541-7B7A-43D3-8B79-37D633B846F1}">
+                <asvg:svgBlip xmlns:asvg="http://schemas.microsoft.com/office/drawing/2016/SVG/main" r:embed="rId7"/>
+              </a:ext>
+            </a:extLst>
+          </a:blip>
+          <a:srcRect/>
+          <a:stretch>
+            <a:fillRect/>
+          </a:stretch>
+        </p:blipFill>
+        <p:spPr bwMode="white">
+          <a:xfrm>
+            <a:off x="7275415" y="5623133"/>
+            <a:ext cx="317500" cy="317500"/>
+          </a:xfrm>
+          <a:prstGeom prst="rect">
+            <a:avLst/>
+          </a:prstGeom>
+          <a:ln>
+            <a:headEnd type="none"/>
+            <a:tailEnd type="none"/>
+          </a:ln>
+        </p:spPr>
+      </p:pic>
+      <p:pic>
+        <p:nvPicPr>
+          <p:cNvPr id="28" name="Graphic 27">
+            <a:extLst>
+              <a:ext uri="{FF2B5EF4-FFF2-40B4-BE49-F238E27FC236}">
+                <a16:creationId xmlns:a16="http://schemas.microsoft.com/office/drawing/2014/main" id="{E44A8033-3F22-57E7-BC26-A5FC65026D50}"/>
+              </a:ext>
+            </a:extLst>
+          </p:cNvPr>
+          <p:cNvPicPr>
+            <a:picLocks noChangeAspect="1"/>
+          </p:cNvPicPr>
+          <p:nvPr/>
+        </p:nvPicPr>
+        <p:blipFill>
+          <a:blip r:embed="rId6">
+            <a:lum/>
+            <a:extLst>
+              <a:ext uri="{96DAC541-7B7A-43D3-8B79-37D633B846F1}">
+                <asvg:svgBlip xmlns:asvg="http://schemas.microsoft.com/office/drawing/2016/SVG/main" r:embed="rId7"/>
+              </a:ext>
+            </a:extLst>
+          </a:blip>
+          <a:srcRect/>
+          <a:stretch>
+            <a:fillRect/>
+          </a:stretch>
+        </p:blipFill>
+        <p:spPr bwMode="white">
+          <a:xfrm>
+            <a:off x="7275342" y="5932615"/>
+            <a:ext cx="317500" cy="317500"/>
+          </a:xfrm>
+          <a:prstGeom prst="rect">
+            <a:avLst/>
+          </a:prstGeom>
+          <a:ln>
+            <a:headEnd type="none"/>
+            <a:tailEnd type="none"/>
+          </a:ln>
+        </p:spPr>
+      </p:pic>
+      <p:pic>
+        <p:nvPicPr>
+          <p:cNvPr id="31" name="Graphic 30">
+            <a:extLst>
+              <a:ext uri="{FF2B5EF4-FFF2-40B4-BE49-F238E27FC236}">
+                <a16:creationId xmlns:a16="http://schemas.microsoft.com/office/drawing/2014/main" id="{E736218D-3632-AA3D-EF9F-5D02BBE87BE7}"/>
+              </a:ext>
+            </a:extLst>
+          </p:cNvPr>
+          <p:cNvPicPr>
+            <a:picLocks noChangeAspect="1"/>
+          </p:cNvPicPr>
+          <p:nvPr/>
+        </p:nvPicPr>
+        <p:blipFill>
+          <a:blip r:embed="rId6">
+            <a:lum/>
+            <a:extLst>
+              <a:ext uri="{96DAC541-7B7A-43D3-8B79-37D633B846F1}">
+                <asvg:svgBlip xmlns:asvg="http://schemas.microsoft.com/office/drawing/2016/SVG/main" r:embed="rId7"/>
+              </a:ext>
+            </a:extLst>
+          </a:blip>
+          <a:srcRect/>
+          <a:stretch>
+            <a:fillRect/>
+          </a:stretch>
+        </p:blipFill>
+        <p:spPr bwMode="white">
+          <a:xfrm>
+            <a:off x="6827854" y="5605048"/>
+            <a:ext cx="317500" cy="317500"/>
+          </a:xfrm>
+          <a:prstGeom prst="rect">
+            <a:avLst/>
+          </a:prstGeom>
+          <a:ln>
+            <a:headEnd type="none"/>
+            <a:tailEnd type="none"/>
+          </a:ln>
+        </p:spPr>
+      </p:pic>
+      <p:pic>
+        <p:nvPicPr>
+          <p:cNvPr id="42" name="Graphic 41">
+            <a:extLst>
+              <a:ext uri="{FF2B5EF4-FFF2-40B4-BE49-F238E27FC236}">
+                <a16:creationId xmlns:a16="http://schemas.microsoft.com/office/drawing/2014/main" id="{7A6EBEAD-1088-9402-35BE-5BA8F3236B71}"/>
+              </a:ext>
+            </a:extLst>
+          </p:cNvPr>
+          <p:cNvPicPr>
+            <a:picLocks noChangeAspect="1"/>
+          </p:cNvPicPr>
+          <p:nvPr/>
+        </p:nvPicPr>
+        <p:blipFill>
+          <a:blip r:embed="rId6">
+            <a:lum/>
+            <a:extLst>
+              <a:ext uri="{96DAC541-7B7A-43D3-8B79-37D633B846F1}">
+                <asvg:svgBlip xmlns:asvg="http://schemas.microsoft.com/office/drawing/2016/SVG/main" r:embed="rId7"/>
+              </a:ext>
+            </a:extLst>
+          </a:blip>
+          <a:srcRect/>
+          <a:stretch>
+            <a:fillRect/>
+          </a:stretch>
+        </p:blipFill>
+        <p:spPr bwMode="white">
+          <a:xfrm>
+            <a:off x="6846754" y="5908411"/>
+            <a:ext cx="317500" cy="317500"/>
+          </a:xfrm>
+          <a:prstGeom prst="rect">
+            <a:avLst/>
+          </a:prstGeom>
+          <a:ln>
+            <a:headEnd type="none"/>
+            <a:tailEnd type="none"/>
+          </a:ln>
+        </p:spPr>
+      </p:pic>
+      <p:pic>
+        <p:nvPicPr>
+          <p:cNvPr id="43" name="Graphic 42">
+            <a:extLst>
+              <a:ext uri="{FF2B5EF4-FFF2-40B4-BE49-F238E27FC236}">
+                <a16:creationId xmlns:a16="http://schemas.microsoft.com/office/drawing/2014/main" id="{2793CB11-4222-2C57-E701-BEE5A64B84B8}"/>
+              </a:ext>
+            </a:extLst>
+          </p:cNvPr>
+          <p:cNvPicPr>
+            <a:picLocks noChangeAspect="1"/>
+          </p:cNvPicPr>
+          <p:nvPr/>
+        </p:nvPicPr>
+        <p:blipFill>
+          <a:blip r:embed="rId4">
+            <a:lum/>
+            <a:extLst>
+              <a:ext uri="{96DAC541-7B7A-43D3-8B79-37D633B846F1}">
+                <asvg:svgBlip xmlns:asvg="http://schemas.microsoft.com/office/drawing/2016/SVG/main" r:embed="rId5"/>
+              </a:ext>
+            </a:extLst>
+          </a:blip>
+          <a:srcRect/>
+          <a:stretch>
+            <a:fillRect/>
+          </a:stretch>
+        </p:blipFill>
+        <p:spPr bwMode="white">
+          <a:xfrm>
+            <a:off x="6270086" y="5636778"/>
+            <a:ext cx="542004" cy="542004"/>
+          </a:xfrm>
+          <a:prstGeom prst="rect">
+            <a:avLst/>
+          </a:prstGeom>
+          <a:ln>
+            <a:headEnd type="none"/>
+            <a:tailEnd type="none"/>
+          </a:ln>
+        </p:spPr>
+      </p:pic>
+      <p:cxnSp>
+        <p:nvCxnSpPr>
+          <p:cNvPr id="46" name="Connector: Elbow 45">
+            <a:extLst>
+              <a:ext uri="{FF2B5EF4-FFF2-40B4-BE49-F238E27FC236}">
+                <a16:creationId xmlns:a16="http://schemas.microsoft.com/office/drawing/2014/main" id="{31371E35-E488-F0A1-1649-7F4EF09E0EF2}"/>
+              </a:ext>
+            </a:extLst>
+          </p:cNvPr>
+          <p:cNvCxnSpPr>
+            <a:cxnSpLocks/>
+            <a:stCxn id="6" idx="1"/>
+            <a:endCxn id="11" idx="2"/>
+          </p:cNvCxnSpPr>
+          <p:nvPr/>
+        </p:nvCxnSpPr>
+        <p:spPr>
+          <a:xfrm rot="10800000">
+            <a:off x="3079375" y="4581053"/>
+            <a:ext cx="3072259" cy="500304"/>
+          </a:xfrm>
+          <a:prstGeom prst="bentConnector2">
+            <a:avLst/>
+          </a:prstGeom>
+          <a:ln>
+            <a:headEnd type="triangle"/>
+            <a:tailEnd type="triangle"/>
+          </a:ln>
+        </p:spPr>
+        <p:style>
+          <a:lnRef idx="1">
+            <a:schemeClr val="accent1"/>
+          </a:lnRef>
+          <a:fillRef idx="0">
+            <a:schemeClr val="accent1"/>
+          </a:fillRef>
+          <a:effectRef idx="0">
+            <a:schemeClr val="accent1"/>
+          </a:effectRef>
+          <a:fontRef idx="minor">
+            <a:schemeClr val="tx1"/>
+          </a:fontRef>
+        </p:style>
+      </p:cxnSp>
+      <p:cxnSp>
+        <p:nvCxnSpPr>
+          <p:cNvPr id="48" name="Connector: Elbow 47">
+            <a:extLst>
+              <a:ext uri="{FF2B5EF4-FFF2-40B4-BE49-F238E27FC236}">
+                <a16:creationId xmlns:a16="http://schemas.microsoft.com/office/drawing/2014/main" id="{BB524125-4753-F78F-7872-5393E3659D8D}"/>
+              </a:ext>
+            </a:extLst>
+          </p:cNvPr>
+          <p:cNvCxnSpPr>
+            <a:cxnSpLocks/>
+            <a:stCxn id="26" idx="1"/>
+            <a:endCxn id="11" idx="2"/>
+          </p:cNvCxnSpPr>
+          <p:nvPr/>
+        </p:nvCxnSpPr>
+        <p:spPr>
+          <a:xfrm rot="10800000">
+            <a:off x="3079375" y="4581054"/>
+            <a:ext cx="3088023" cy="1352345"/>
+          </a:xfrm>
+          <a:prstGeom prst="bentConnector2">
+            <a:avLst/>
+          </a:prstGeom>
+          <a:ln>
+            <a:headEnd type="triangle"/>
+            <a:tailEnd type="triangle"/>
+          </a:ln>
+        </p:spPr>
+        <p:style>
+          <a:lnRef idx="1">
+            <a:schemeClr val="accent1"/>
+          </a:lnRef>
+          <a:fillRef idx="0">
+            <a:schemeClr val="accent1"/>
+          </a:fillRef>
+          <a:effectRef idx="0">
+            <a:schemeClr val="accent1"/>
+          </a:effectRef>
+          <a:fontRef idx="minor">
+            <a:schemeClr val="tx1"/>
+          </a:fontRef>
+        </p:style>
+      </p:cxnSp>
+      <p:cxnSp>
+        <p:nvCxnSpPr>
+          <p:cNvPr id="70" name="Connector: Elbow 69">
+            <a:extLst>
+              <a:ext uri="{FF2B5EF4-FFF2-40B4-BE49-F238E27FC236}">
+                <a16:creationId xmlns:a16="http://schemas.microsoft.com/office/drawing/2014/main" id="{43060D9E-3396-9FE0-CACD-7065B28D6BE7}"/>
+              </a:ext>
+            </a:extLst>
+          </p:cNvPr>
+          <p:cNvCxnSpPr>
+            <a:stCxn id="11" idx="3"/>
+            <a:endCxn id="15" idx="1"/>
+          </p:cNvCxnSpPr>
+          <p:nvPr/>
+        </p:nvCxnSpPr>
+        <p:spPr>
+          <a:xfrm flipV="1">
+            <a:off x="4242838" y="1785013"/>
+            <a:ext cx="890855" cy="1198104"/>
+          </a:xfrm>
+          <a:prstGeom prst="bentConnector3">
+            <a:avLst/>
+          </a:prstGeom>
+          <a:ln>
+            <a:headEnd type="triangle"/>
+            <a:tailEnd type="triangle"/>
+          </a:ln>
+        </p:spPr>
+        <p:style>
+          <a:lnRef idx="1">
+            <a:schemeClr val="accent1"/>
+          </a:lnRef>
+          <a:fillRef idx="0">
+            <a:schemeClr val="accent1"/>
+          </a:fillRef>
+          <a:effectRef idx="0">
+            <a:schemeClr val="accent1"/>
+          </a:effectRef>
+          <a:fontRef idx="minor">
+            <a:schemeClr val="tx1"/>
+          </a:fontRef>
+        </p:style>
+      </p:cxnSp>
+      <p:sp>
+        <p:nvSpPr>
+          <p:cNvPr id="76" name="TextBox 75">
+            <a:extLst>
+              <a:ext uri="{FF2B5EF4-FFF2-40B4-BE49-F238E27FC236}">
+                <a16:creationId xmlns:a16="http://schemas.microsoft.com/office/drawing/2014/main" id="{013D1133-F64E-AC0D-22CD-308962275B73}"/>
+              </a:ext>
+            </a:extLst>
+          </p:cNvPr>
+          <p:cNvSpPr txBox="1"/>
+          <p:nvPr/>
+        </p:nvSpPr>
+        <p:spPr>
+          <a:xfrm>
+            <a:off x="6153703" y="2372664"/>
+            <a:ext cx="4007094" cy="1107996"/>
+          </a:xfrm>
+          <a:prstGeom prst="rect">
+            <a:avLst/>
+          </a:prstGeom>
+          <a:noFill/>
+        </p:spPr>
+        <p:txBody>
+          <a:bodyPr wrap="square" rtlCol="0">
+            <a:spAutoFit/>
+          </a:bodyPr>
+          <a:lstStyle/>
+          <a:p>
+            <a:r>
+              <a:rPr lang="nb-NO" sz="1100" dirty="0"/>
+              <a:t>2. User Profiles</a:t>
+            </a:r>
+          </a:p>
+          <a:p>
+            <a:r>
+              <a:rPr lang="nb-NO" sz="1100" dirty="0">
+                <a:solidFill>
+                  <a:schemeClr val="bg2">
+                    <a:lumMod val="50000"/>
+                  </a:schemeClr>
+                </a:solidFill>
+              </a:rPr>
+              <a:t>After discovery of a user’s relays on the Discovery Relay, Nostria will connect to that user’s relays to retrieve their updated profile and other information that is relevant. User’s does not need to utilize a large centralized relay to be discovered, they only need a small set of reliable relays and media servers.</a:t>
+            </a:r>
+          </a:p>
+        </p:txBody>
+      </p:sp>
+    </p:spTree>
+    <p:extLst>
+      <p:ext uri="{BB962C8B-B14F-4D97-AF65-F5344CB8AC3E}">
+        <p14:creationId xmlns:p14="http://schemas.microsoft.com/office/powerpoint/2010/main" val="1107573680"/>
       </p:ext>
     </p:extLst>
   </p:cSld>

</xml_diff>

<commit_message>
Replace Nostria Infrastructure PDF with updated diagrams and remove the old version. Update the PPTX file to reflect recent changes in the infrastructure documentation.
</commit_message>
<xml_diff>
--- a/docs/nostria-infrastructure.pptx
+++ b/docs/nostria-infrastructure.pptx
@@ -7,6 +7,7 @@
   <p:sldIdLst>
     <p:sldId id="257" r:id="rId2"/>
     <p:sldId id="258" r:id="rId3"/>
+    <p:sldId id="259" r:id="rId4"/>
   </p:sldIdLst>
   <p:sldSz cx="12192000" cy="6858000"/>
   <p:notesSz cx="6858000" cy="9144000"/>
@@ -262,7 +263,7 @@
           <a:p>
             <a:fld id="{D4ACDACF-CEDB-4137-9738-8F96BEE6B6BA}" type="datetimeFigureOut">
               <a:rPr lang="nb-NO" smtClean="0"/>
-              <a:t>05.05.2025</a:t>
+              <a:t>07.05.2025</a:t>
             </a:fld>
             <a:endParaRPr lang="nb-NO"/>
           </a:p>
@@ -462,7 +463,7 @@
           <a:p>
             <a:fld id="{D4ACDACF-CEDB-4137-9738-8F96BEE6B6BA}" type="datetimeFigureOut">
               <a:rPr lang="nb-NO" smtClean="0"/>
-              <a:t>05.05.2025</a:t>
+              <a:t>07.05.2025</a:t>
             </a:fld>
             <a:endParaRPr lang="nb-NO"/>
           </a:p>
@@ -672,7 +673,7 @@
           <a:p>
             <a:fld id="{D4ACDACF-CEDB-4137-9738-8F96BEE6B6BA}" type="datetimeFigureOut">
               <a:rPr lang="nb-NO" smtClean="0"/>
-              <a:t>05.05.2025</a:t>
+              <a:t>07.05.2025</a:t>
             </a:fld>
             <a:endParaRPr lang="nb-NO"/>
           </a:p>
@@ -872,7 +873,7 @@
           <a:p>
             <a:fld id="{D4ACDACF-CEDB-4137-9738-8F96BEE6B6BA}" type="datetimeFigureOut">
               <a:rPr lang="nb-NO" smtClean="0"/>
-              <a:t>05.05.2025</a:t>
+              <a:t>07.05.2025</a:t>
             </a:fld>
             <a:endParaRPr lang="nb-NO"/>
           </a:p>
@@ -1148,7 +1149,7 @@
           <a:p>
             <a:fld id="{D4ACDACF-CEDB-4137-9738-8F96BEE6B6BA}" type="datetimeFigureOut">
               <a:rPr lang="nb-NO" smtClean="0"/>
-              <a:t>05.05.2025</a:t>
+              <a:t>07.05.2025</a:t>
             </a:fld>
             <a:endParaRPr lang="nb-NO"/>
           </a:p>
@@ -1416,7 +1417,7 @@
           <a:p>
             <a:fld id="{D4ACDACF-CEDB-4137-9738-8F96BEE6B6BA}" type="datetimeFigureOut">
               <a:rPr lang="nb-NO" smtClean="0"/>
-              <a:t>05.05.2025</a:t>
+              <a:t>07.05.2025</a:t>
             </a:fld>
             <a:endParaRPr lang="nb-NO"/>
           </a:p>
@@ -1831,7 +1832,7 @@
           <a:p>
             <a:fld id="{D4ACDACF-CEDB-4137-9738-8F96BEE6B6BA}" type="datetimeFigureOut">
               <a:rPr lang="nb-NO" smtClean="0"/>
-              <a:t>05.05.2025</a:t>
+              <a:t>07.05.2025</a:t>
             </a:fld>
             <a:endParaRPr lang="nb-NO"/>
           </a:p>
@@ -1973,7 +1974,7 @@
           <a:p>
             <a:fld id="{D4ACDACF-CEDB-4137-9738-8F96BEE6B6BA}" type="datetimeFigureOut">
               <a:rPr lang="nb-NO" smtClean="0"/>
-              <a:t>05.05.2025</a:t>
+              <a:t>07.05.2025</a:t>
             </a:fld>
             <a:endParaRPr lang="nb-NO"/>
           </a:p>
@@ -2086,7 +2087,7 @@
           <a:p>
             <a:fld id="{D4ACDACF-CEDB-4137-9738-8F96BEE6B6BA}" type="datetimeFigureOut">
               <a:rPr lang="nb-NO" smtClean="0"/>
-              <a:t>05.05.2025</a:t>
+              <a:t>07.05.2025</a:t>
             </a:fld>
             <a:endParaRPr lang="nb-NO"/>
           </a:p>
@@ -2399,7 +2400,7 @@
           <a:p>
             <a:fld id="{D4ACDACF-CEDB-4137-9738-8F96BEE6B6BA}" type="datetimeFigureOut">
               <a:rPr lang="nb-NO" smtClean="0"/>
-              <a:t>05.05.2025</a:t>
+              <a:t>07.05.2025</a:t>
             </a:fld>
             <a:endParaRPr lang="nb-NO"/>
           </a:p>
@@ -2688,7 +2689,7 @@
           <a:p>
             <a:fld id="{D4ACDACF-CEDB-4137-9738-8F96BEE6B6BA}" type="datetimeFigureOut">
               <a:rPr lang="nb-NO" smtClean="0"/>
-              <a:t>05.05.2025</a:t>
+              <a:t>07.05.2025</a:t>
             </a:fld>
             <a:endParaRPr lang="nb-NO"/>
           </a:p>
@@ -2931,7 +2932,7 @@
           <a:p>
             <a:fld id="{D4ACDACF-CEDB-4137-9738-8F96BEE6B6BA}" type="datetimeFigureOut">
               <a:rPr lang="nb-NO" smtClean="0"/>
-              <a:t>05.05.2025</a:t>
+              <a:t>07.05.2025</a:t>
             </a:fld>
             <a:endParaRPr lang="nb-NO"/>
           </a:p>
@@ -7230,6 +7231,1334 @@
 </p:sld>
 </file>
 
+<file path=ppt/slides/slide3.xml><?xml version="1.0" encoding="utf-8"?>
+<p:sld xmlns:a="http://schemas.openxmlformats.org/drawingml/2006/main" xmlns:r="http://schemas.openxmlformats.org/officeDocument/2006/relationships" xmlns:p="http://schemas.openxmlformats.org/presentationml/2006/main">
+  <p:cSld>
+    <p:spTree>
+      <p:nvGrpSpPr>
+        <p:cNvPr id="1" name="">
+          <a:extLst>
+            <a:ext uri="{FF2B5EF4-FFF2-40B4-BE49-F238E27FC236}">
+              <a16:creationId xmlns:a16="http://schemas.microsoft.com/office/drawing/2014/main" id="{F6194CEF-CDF8-568F-7D61-C9C9DC3BEC43}"/>
+            </a:ext>
+          </a:extLst>
+        </p:cNvPr>
+        <p:cNvGrpSpPr/>
+        <p:nvPr/>
+      </p:nvGrpSpPr>
+      <p:grpSpPr>
+        <a:xfrm>
+          <a:off x="0" y="0"/>
+          <a:ext cx="0" cy="0"/>
+          <a:chOff x="0" y="0"/>
+          <a:chExt cx="0" cy="0"/>
+        </a:xfrm>
+      </p:grpSpPr>
+      <p:sp>
+        <p:nvSpPr>
+          <p:cNvPr id="21" name="Rectangle: Rounded Corners 20">
+            <a:extLst>
+              <a:ext uri="{FF2B5EF4-FFF2-40B4-BE49-F238E27FC236}">
+                <a16:creationId xmlns:a16="http://schemas.microsoft.com/office/drawing/2014/main" id="{A307D0C6-7659-F4E3-A2D0-B0CFB477065D}"/>
+              </a:ext>
+            </a:extLst>
+          </p:cNvPr>
+          <p:cNvSpPr/>
+          <p:nvPr/>
+        </p:nvSpPr>
+        <p:spPr>
+          <a:xfrm>
+            <a:off x="9047298" y="2961824"/>
+            <a:ext cx="1772806" cy="3195873"/>
+          </a:xfrm>
+          <a:prstGeom prst="roundRect">
+            <a:avLst/>
+          </a:prstGeom>
+          <a:ln>
+            <a:prstDash val="dash"/>
+          </a:ln>
+        </p:spPr>
+        <p:style>
+          <a:lnRef idx="2">
+            <a:schemeClr val="dk1"/>
+          </a:lnRef>
+          <a:fillRef idx="1">
+            <a:schemeClr val="lt1"/>
+          </a:fillRef>
+          <a:effectRef idx="0">
+            <a:schemeClr val="dk1"/>
+          </a:effectRef>
+          <a:fontRef idx="minor">
+            <a:schemeClr val="dk1"/>
+          </a:fontRef>
+        </p:style>
+        <p:txBody>
+          <a:bodyPr rtlCol="0" anchor="ctr"/>
+          <a:lstStyle/>
+          <a:p>
+            <a:pPr algn="ctr"/>
+            <a:endParaRPr lang="nb-NO" dirty="0"/>
+          </a:p>
+        </p:txBody>
+      </p:sp>
+      <p:sp>
+        <p:nvSpPr>
+          <p:cNvPr id="16" name="TextBox 15">
+            <a:extLst>
+              <a:ext uri="{FF2B5EF4-FFF2-40B4-BE49-F238E27FC236}">
+                <a16:creationId xmlns:a16="http://schemas.microsoft.com/office/drawing/2014/main" id="{F973C679-95C4-DF51-B730-084CE8884A52}"/>
+              </a:ext>
+            </a:extLst>
+          </p:cNvPr>
+          <p:cNvSpPr txBox="1"/>
+          <p:nvPr/>
+        </p:nvSpPr>
+        <p:spPr>
+          <a:xfrm>
+            <a:off x="9152373" y="3578806"/>
+            <a:ext cx="1511952" cy="415498"/>
+          </a:xfrm>
+          <a:prstGeom prst="rect">
+            <a:avLst/>
+          </a:prstGeom>
+          <a:noFill/>
+        </p:spPr>
+        <p:txBody>
+          <a:bodyPr wrap="none" rtlCol="0">
+            <a:spAutoFit/>
+          </a:bodyPr>
+          <a:lstStyle/>
+          <a:p>
+            <a:pPr algn="ctr"/>
+            <a:r>
+              <a:rPr lang="nb-NO" sz="1050" dirty="0"/>
+              <a:t>Discovery Relay</a:t>
+            </a:r>
+          </a:p>
+          <a:p>
+            <a:pPr algn="ctr"/>
+            <a:r>
+              <a:rPr lang="nb-NO" sz="1050" dirty="0">
+                <a:solidFill>
+                  <a:schemeClr val="bg2">
+                    <a:lumMod val="50000"/>
+                  </a:schemeClr>
+                </a:solidFill>
+              </a:rPr>
+              <a:t>Discovery-jp.nostria.app</a:t>
+            </a:r>
+          </a:p>
+        </p:txBody>
+      </p:sp>
+      <p:pic>
+        <p:nvPicPr>
+          <p:cNvPr id="110" name="Graphic 109">
+            <a:extLst>
+              <a:ext uri="{FF2B5EF4-FFF2-40B4-BE49-F238E27FC236}">
+                <a16:creationId xmlns:a16="http://schemas.microsoft.com/office/drawing/2014/main" id="{CC8A21C3-BA82-47AE-5423-42CD7A94900C}"/>
+              </a:ext>
+            </a:extLst>
+          </p:cNvPr>
+          <p:cNvPicPr>
+            <a:picLocks noChangeAspect="1"/>
+          </p:cNvPicPr>
+          <p:nvPr/>
+        </p:nvPicPr>
+        <p:blipFill>
+          <a:blip r:embed="rId2">
+            <a:extLst>
+              <a:ext uri="{96DAC541-7B7A-43D3-8B79-37D633B846F1}">
+                <asvg:svgBlip xmlns:asvg="http://schemas.microsoft.com/office/drawing/2016/SVG/main" r:embed="rId3"/>
+              </a:ext>
+            </a:extLst>
+          </a:blip>
+          <a:stretch>
+            <a:fillRect/>
+          </a:stretch>
+        </p:blipFill>
+        <p:spPr>
+          <a:xfrm>
+            <a:off x="3399485" y="215239"/>
+            <a:ext cx="631843" cy="631843"/>
+          </a:xfrm>
+          <a:prstGeom prst="rect">
+            <a:avLst/>
+          </a:prstGeom>
+        </p:spPr>
+      </p:pic>
+      <p:sp>
+        <p:nvSpPr>
+          <p:cNvPr id="111" name="TextBox 110">
+            <a:extLst>
+              <a:ext uri="{FF2B5EF4-FFF2-40B4-BE49-F238E27FC236}">
+                <a16:creationId xmlns:a16="http://schemas.microsoft.com/office/drawing/2014/main" id="{4B7EE733-F783-8D91-E3DB-4437A979FDB4}"/>
+              </a:ext>
+            </a:extLst>
+          </p:cNvPr>
+          <p:cNvSpPr txBox="1"/>
+          <p:nvPr/>
+        </p:nvSpPr>
+        <p:spPr>
+          <a:xfrm>
+            <a:off x="4134938" y="269550"/>
+            <a:ext cx="3914983" cy="523220"/>
+          </a:xfrm>
+          <a:prstGeom prst="rect">
+            <a:avLst/>
+          </a:prstGeom>
+          <a:noFill/>
+        </p:spPr>
+        <p:txBody>
+          <a:bodyPr wrap="none" rtlCol="0">
+            <a:spAutoFit/>
+          </a:bodyPr>
+          <a:lstStyle/>
+          <a:p>
+            <a:r>
+              <a:rPr lang="nb-NO" sz="2800" b="1" dirty="0"/>
+              <a:t>Nostria Architecture v1.0</a:t>
+            </a:r>
+          </a:p>
+        </p:txBody>
+      </p:sp>
+      <p:sp>
+        <p:nvSpPr>
+          <p:cNvPr id="19" name="TextBox 18">
+            <a:extLst>
+              <a:ext uri="{FF2B5EF4-FFF2-40B4-BE49-F238E27FC236}">
+                <a16:creationId xmlns:a16="http://schemas.microsoft.com/office/drawing/2014/main" id="{B5C36431-F84D-7701-8BB4-3782DCD57B99}"/>
+              </a:ext>
+            </a:extLst>
+          </p:cNvPr>
+          <p:cNvSpPr txBox="1"/>
+          <p:nvPr/>
+        </p:nvSpPr>
+        <p:spPr>
+          <a:xfrm>
+            <a:off x="4042827" y="1456359"/>
+            <a:ext cx="4007094" cy="769441"/>
+          </a:xfrm>
+          <a:prstGeom prst="rect">
+            <a:avLst/>
+          </a:prstGeom>
+          <a:noFill/>
+        </p:spPr>
+        <p:txBody>
+          <a:bodyPr wrap="square" rtlCol="0">
+            <a:spAutoFit/>
+          </a:bodyPr>
+          <a:lstStyle/>
+          <a:p>
+            <a:r>
+              <a:rPr lang="nb-NO" sz="1100" dirty="0"/>
+              <a:t>1. Discovery of users</a:t>
+            </a:r>
+          </a:p>
+          <a:p>
+            <a:r>
+              <a:rPr lang="nb-NO" sz="1100" dirty="0">
+                <a:solidFill>
+                  <a:schemeClr val="bg2">
+                    <a:lumMod val="50000"/>
+                  </a:schemeClr>
+                </a:solidFill>
+              </a:rPr>
+              <a:t>When looking up a user on Nostria, a request is sent to the closests Discovery Relay to find the User Relays. The Discovery relay holds a global list of all Nostr user’s Relay Lists, not just Nostria users.</a:t>
+            </a:r>
+          </a:p>
+        </p:txBody>
+      </p:sp>
+      <p:sp>
+        <p:nvSpPr>
+          <p:cNvPr id="24" name="TextBox 23">
+            <a:extLst>
+              <a:ext uri="{FF2B5EF4-FFF2-40B4-BE49-F238E27FC236}">
+                <a16:creationId xmlns:a16="http://schemas.microsoft.com/office/drawing/2014/main" id="{B9D8C9D5-5297-914B-4107-CF5E04B97D99}"/>
+              </a:ext>
+            </a:extLst>
+          </p:cNvPr>
+          <p:cNvSpPr txBox="1"/>
+          <p:nvPr/>
+        </p:nvSpPr>
+        <p:spPr>
+          <a:xfrm>
+            <a:off x="4025367" y="3306012"/>
+            <a:ext cx="4007094" cy="1107996"/>
+          </a:xfrm>
+          <a:prstGeom prst="rect">
+            <a:avLst/>
+          </a:prstGeom>
+          <a:noFill/>
+        </p:spPr>
+        <p:txBody>
+          <a:bodyPr wrap="square" rtlCol="0">
+            <a:spAutoFit/>
+          </a:bodyPr>
+          <a:lstStyle/>
+          <a:p>
+            <a:r>
+              <a:rPr lang="nb-NO" sz="1100" dirty="0"/>
+              <a:t>3. Interacting with users</a:t>
+            </a:r>
+          </a:p>
+          <a:p>
+            <a:r>
+              <a:rPr lang="nb-NO" sz="1100" dirty="0">
+                <a:solidFill>
+                  <a:schemeClr val="bg2">
+                    <a:lumMod val="50000"/>
+                  </a:schemeClr>
+                </a:solidFill>
+              </a:rPr>
+              <a:t>When Nostria user’s interact with other users, commenting on their posts, send direct messages or join group chats, Nostria will publish events both to the receivers and the the current user’s relays. This ensures the user always has a full set of their data, accessible on their user relays.</a:t>
+            </a:r>
+          </a:p>
+        </p:txBody>
+      </p:sp>
+      <p:sp>
+        <p:nvSpPr>
+          <p:cNvPr id="76" name="TextBox 75">
+            <a:extLst>
+              <a:ext uri="{FF2B5EF4-FFF2-40B4-BE49-F238E27FC236}">
+                <a16:creationId xmlns:a16="http://schemas.microsoft.com/office/drawing/2014/main" id="{D48796DC-4AA1-6339-9E52-0C01FEDB2A55}"/>
+              </a:ext>
+            </a:extLst>
+          </p:cNvPr>
+          <p:cNvSpPr txBox="1"/>
+          <p:nvPr/>
+        </p:nvSpPr>
+        <p:spPr>
+          <a:xfrm>
+            <a:off x="4026957" y="2224297"/>
+            <a:ext cx="4007094" cy="1107996"/>
+          </a:xfrm>
+          <a:prstGeom prst="rect">
+            <a:avLst/>
+          </a:prstGeom>
+          <a:noFill/>
+        </p:spPr>
+        <p:txBody>
+          <a:bodyPr wrap="square" rtlCol="0">
+            <a:spAutoFit/>
+          </a:bodyPr>
+          <a:lstStyle/>
+          <a:p>
+            <a:r>
+              <a:rPr lang="nb-NO" sz="1100" dirty="0"/>
+              <a:t>2. User Profiles</a:t>
+            </a:r>
+          </a:p>
+          <a:p>
+            <a:r>
+              <a:rPr lang="nb-NO" sz="1100" dirty="0">
+                <a:solidFill>
+                  <a:schemeClr val="bg2">
+                    <a:lumMod val="50000"/>
+                  </a:schemeClr>
+                </a:solidFill>
+              </a:rPr>
+              <a:t>After discovery of a user’s relays on the Discovery Relay, Nostria will connect to that user’s relays to retrieve their updated profile and other information that is relevant. User’s does not need to utilize a large centralized relay to be discovered, they only need a small set of reliable relays and media servers.</a:t>
+            </a:r>
+          </a:p>
+        </p:txBody>
+      </p:sp>
+      <p:pic>
+        <p:nvPicPr>
+          <p:cNvPr id="13" name="Graphic 12">
+            <a:extLst>
+              <a:ext uri="{FF2B5EF4-FFF2-40B4-BE49-F238E27FC236}">
+                <a16:creationId xmlns:a16="http://schemas.microsoft.com/office/drawing/2014/main" id="{D2B2550B-BA51-1FDA-5FCA-606D8AFB9E93}"/>
+              </a:ext>
+            </a:extLst>
+          </p:cNvPr>
+          <p:cNvPicPr>
+            <a:picLocks noChangeAspect="1"/>
+          </p:cNvPicPr>
+          <p:nvPr/>
+        </p:nvPicPr>
+        <p:blipFill>
+          <a:blip r:embed="rId4">
+            <a:lum/>
+            <a:extLst>
+              <a:ext uri="{96DAC541-7B7A-43D3-8B79-37D633B846F1}">
+                <asvg:svgBlip xmlns:asvg="http://schemas.microsoft.com/office/drawing/2016/SVG/main" r:embed="rId5"/>
+              </a:ext>
+            </a:extLst>
+          </a:blip>
+          <a:srcRect/>
+          <a:stretch>
+            <a:fillRect/>
+          </a:stretch>
+        </p:blipFill>
+        <p:spPr bwMode="white">
+          <a:xfrm>
+            <a:off x="9710593" y="1454449"/>
+            <a:ext cx="439387" cy="439387"/>
+          </a:xfrm>
+          <a:prstGeom prst="rect">
+            <a:avLst/>
+          </a:prstGeom>
+          <a:ln>
+            <a:headEnd type="none"/>
+            <a:tailEnd type="none"/>
+          </a:ln>
+        </p:spPr>
+      </p:pic>
+      <p:sp>
+        <p:nvSpPr>
+          <p:cNvPr id="14" name="TextBox 13">
+            <a:extLst>
+              <a:ext uri="{FF2B5EF4-FFF2-40B4-BE49-F238E27FC236}">
+                <a16:creationId xmlns:a16="http://schemas.microsoft.com/office/drawing/2014/main" id="{EB47314B-2DAA-42BC-BA51-A5FB1955F7AC}"/>
+              </a:ext>
+            </a:extLst>
+          </p:cNvPr>
+          <p:cNvSpPr txBox="1"/>
+          <p:nvPr/>
+        </p:nvSpPr>
+        <p:spPr>
+          <a:xfrm>
+            <a:off x="9150275" y="1918931"/>
+            <a:ext cx="1566454" cy="738664"/>
+          </a:xfrm>
+          <a:prstGeom prst="rect">
+            <a:avLst/>
+          </a:prstGeom>
+          <a:noFill/>
+        </p:spPr>
+        <p:txBody>
+          <a:bodyPr wrap="none" rtlCol="0">
+            <a:spAutoFit/>
+          </a:bodyPr>
+          <a:lstStyle/>
+          <a:p>
+            <a:pPr algn="ctr"/>
+            <a:r>
+              <a:rPr lang="nb-NO" sz="1050" dirty="0"/>
+              <a:t>Nostria in Tokyo</a:t>
+            </a:r>
+          </a:p>
+          <a:p>
+            <a:pPr algn="ctr"/>
+            <a:r>
+              <a:rPr lang="nb-NO" sz="1050" dirty="0">
+                <a:solidFill>
+                  <a:schemeClr val="bg2">
+                    <a:lumMod val="50000"/>
+                  </a:schemeClr>
+                </a:solidFill>
+              </a:rPr>
+              <a:t>When signing up, users is</a:t>
+            </a:r>
+          </a:p>
+          <a:p>
+            <a:pPr algn="ctr"/>
+            <a:r>
+              <a:rPr lang="nb-NO" sz="1050" dirty="0">
+                <a:solidFill>
+                  <a:schemeClr val="bg2">
+                    <a:lumMod val="50000"/>
+                  </a:schemeClr>
+                </a:solidFill>
+              </a:rPr>
+              <a:t>assigned user relay</a:t>
+            </a:r>
+          </a:p>
+          <a:p>
+            <a:pPr algn="ctr"/>
+            <a:r>
+              <a:rPr lang="nb-NO" sz="1050" dirty="0">
+                <a:solidFill>
+                  <a:schemeClr val="bg2">
+                    <a:lumMod val="50000"/>
+                  </a:schemeClr>
+                </a:solidFill>
+              </a:rPr>
+              <a:t>and media server</a:t>
+            </a:r>
+          </a:p>
+        </p:txBody>
+      </p:sp>
+      <p:pic>
+        <p:nvPicPr>
+          <p:cNvPr id="18" name="Graphic 17">
+            <a:extLst>
+              <a:ext uri="{FF2B5EF4-FFF2-40B4-BE49-F238E27FC236}">
+                <a16:creationId xmlns:a16="http://schemas.microsoft.com/office/drawing/2014/main" id="{7E3EB2BC-79B8-7D7D-B7A5-F96B46020896}"/>
+              </a:ext>
+            </a:extLst>
+          </p:cNvPr>
+          <p:cNvPicPr>
+            <a:picLocks noChangeAspect="1"/>
+          </p:cNvPicPr>
+          <p:nvPr/>
+        </p:nvPicPr>
+        <p:blipFill>
+          <a:blip r:embed="rId6">
+            <a:lum/>
+            <a:extLst>
+              <a:ext uri="{96DAC541-7B7A-43D3-8B79-37D633B846F1}">
+                <asvg:svgBlip xmlns:asvg="http://schemas.microsoft.com/office/drawing/2016/SVG/main" r:embed="rId7"/>
+              </a:ext>
+            </a:extLst>
+          </a:blip>
+          <a:srcRect/>
+          <a:stretch>
+            <a:fillRect/>
+          </a:stretch>
+        </p:blipFill>
+        <p:spPr bwMode="white">
+          <a:xfrm>
+            <a:off x="9590849" y="3004767"/>
+            <a:ext cx="635000" cy="635000"/>
+          </a:xfrm>
+          <a:prstGeom prst="rect">
+            <a:avLst/>
+          </a:prstGeom>
+          <a:ln>
+            <a:headEnd type="none"/>
+            <a:tailEnd type="none"/>
+          </a:ln>
+        </p:spPr>
+      </p:pic>
+      <p:sp>
+        <p:nvSpPr>
+          <p:cNvPr id="23" name="TextBox 22">
+            <a:extLst>
+              <a:ext uri="{FF2B5EF4-FFF2-40B4-BE49-F238E27FC236}">
+                <a16:creationId xmlns:a16="http://schemas.microsoft.com/office/drawing/2014/main" id="{290B7332-A18C-55DF-9367-2B62374E7F8D}"/>
+              </a:ext>
+            </a:extLst>
+          </p:cNvPr>
+          <p:cNvSpPr txBox="1"/>
+          <p:nvPr/>
+        </p:nvSpPr>
+        <p:spPr>
+          <a:xfrm>
+            <a:off x="9300719" y="4564407"/>
+            <a:ext cx="1199366" cy="415498"/>
+          </a:xfrm>
+          <a:prstGeom prst="rect">
+            <a:avLst/>
+          </a:prstGeom>
+          <a:noFill/>
+        </p:spPr>
+        <p:txBody>
+          <a:bodyPr wrap="none" rtlCol="0">
+            <a:spAutoFit/>
+          </a:bodyPr>
+          <a:lstStyle/>
+          <a:p>
+            <a:pPr algn="ctr"/>
+            <a:r>
+              <a:rPr lang="nb-NO" sz="1050" dirty="0"/>
+              <a:t>User Relays</a:t>
+            </a:r>
+          </a:p>
+          <a:p>
+            <a:pPr algn="ctr"/>
+            <a:r>
+              <a:rPr lang="nb-NO" sz="1050" dirty="0">
+                <a:solidFill>
+                  <a:schemeClr val="bg2">
+                    <a:lumMod val="50000"/>
+                  </a:schemeClr>
+                </a:solidFill>
+              </a:rPr>
+              <a:t>ribo-jp.nostria.app</a:t>
+            </a:r>
+          </a:p>
+        </p:txBody>
+      </p:sp>
+      <p:pic>
+        <p:nvPicPr>
+          <p:cNvPr id="38" name="Graphic 37">
+            <a:extLst>
+              <a:ext uri="{FF2B5EF4-FFF2-40B4-BE49-F238E27FC236}">
+                <a16:creationId xmlns:a16="http://schemas.microsoft.com/office/drawing/2014/main" id="{9572A3CB-48B3-E8E6-93DF-B227A813D61B}"/>
+              </a:ext>
+            </a:extLst>
+          </p:cNvPr>
+          <p:cNvPicPr>
+            <a:picLocks noChangeAspect="1"/>
+          </p:cNvPicPr>
+          <p:nvPr/>
+        </p:nvPicPr>
+        <p:blipFill>
+          <a:blip r:embed="rId8">
+            <a:lum/>
+            <a:extLst>
+              <a:ext uri="{96DAC541-7B7A-43D3-8B79-37D633B846F1}">
+                <asvg:svgBlip xmlns:asvg="http://schemas.microsoft.com/office/drawing/2016/SVG/main" r:embed="rId9"/>
+              </a:ext>
+            </a:extLst>
+          </a:blip>
+          <a:srcRect/>
+          <a:stretch>
+            <a:fillRect/>
+          </a:stretch>
+        </p:blipFill>
+        <p:spPr bwMode="white">
+          <a:xfrm>
+            <a:off x="9613358" y="5037066"/>
+            <a:ext cx="635000" cy="635000"/>
+          </a:xfrm>
+          <a:prstGeom prst="rect">
+            <a:avLst/>
+          </a:prstGeom>
+          <a:ln>
+            <a:headEnd type="none"/>
+            <a:tailEnd type="none"/>
+          </a:ln>
+        </p:spPr>
+      </p:pic>
+      <p:sp>
+        <p:nvSpPr>
+          <p:cNvPr id="39" name="TextBox 38">
+            <a:extLst>
+              <a:ext uri="{FF2B5EF4-FFF2-40B4-BE49-F238E27FC236}">
+                <a16:creationId xmlns:a16="http://schemas.microsoft.com/office/drawing/2014/main" id="{5F4798A7-A39E-BE13-D453-23A288A87540}"/>
+              </a:ext>
+            </a:extLst>
+          </p:cNvPr>
+          <p:cNvSpPr txBox="1"/>
+          <p:nvPr/>
+        </p:nvSpPr>
+        <p:spPr>
+          <a:xfrm>
+            <a:off x="9300719" y="5577113"/>
+            <a:ext cx="1260280" cy="415498"/>
+          </a:xfrm>
+          <a:prstGeom prst="rect">
+            <a:avLst/>
+          </a:prstGeom>
+          <a:noFill/>
+        </p:spPr>
+        <p:txBody>
+          <a:bodyPr wrap="none" rtlCol="0">
+            <a:spAutoFit/>
+          </a:bodyPr>
+          <a:lstStyle/>
+          <a:p>
+            <a:pPr algn="ctr"/>
+            <a:r>
+              <a:rPr lang="nb-NO" sz="1050" dirty="0"/>
+              <a:t>Media Servers</a:t>
+            </a:r>
+          </a:p>
+          <a:p>
+            <a:pPr algn="ctr"/>
+            <a:r>
+              <a:rPr lang="nb-NO" sz="1050" dirty="0">
+                <a:solidFill>
+                  <a:schemeClr val="bg2">
+                    <a:lumMod val="50000"/>
+                  </a:schemeClr>
+                </a:solidFill>
+              </a:rPr>
+              <a:t>mibo-jp.nostria.app</a:t>
+            </a:r>
+          </a:p>
+        </p:txBody>
+      </p:sp>
+      <p:pic>
+        <p:nvPicPr>
+          <p:cNvPr id="40" name="Graphic 39">
+            <a:extLst>
+              <a:ext uri="{FF2B5EF4-FFF2-40B4-BE49-F238E27FC236}">
+                <a16:creationId xmlns:a16="http://schemas.microsoft.com/office/drawing/2014/main" id="{77D91B9C-A9FC-14AE-F7B2-847C012DB040}"/>
+              </a:ext>
+            </a:extLst>
+          </p:cNvPr>
+          <p:cNvPicPr>
+            <a:picLocks noChangeAspect="1"/>
+          </p:cNvPicPr>
+          <p:nvPr/>
+        </p:nvPicPr>
+        <p:blipFill>
+          <a:blip r:embed="rId8">
+            <a:lum/>
+            <a:extLst>
+              <a:ext uri="{96DAC541-7B7A-43D3-8B79-37D633B846F1}">
+                <asvg:svgBlip xmlns:asvg="http://schemas.microsoft.com/office/drawing/2016/SVG/main" r:embed="rId9"/>
+              </a:ext>
+            </a:extLst>
+          </a:blip>
+          <a:srcRect/>
+          <a:stretch>
+            <a:fillRect/>
+          </a:stretch>
+        </p:blipFill>
+        <p:spPr bwMode="white">
+          <a:xfrm>
+            <a:off x="9598225" y="4033401"/>
+            <a:ext cx="635000" cy="635000"/>
+          </a:xfrm>
+          <a:prstGeom prst="rect">
+            <a:avLst/>
+          </a:prstGeom>
+          <a:ln>
+            <a:headEnd type="none"/>
+            <a:tailEnd type="none"/>
+          </a:ln>
+        </p:spPr>
+      </p:pic>
+      <p:cxnSp>
+        <p:nvCxnSpPr>
+          <p:cNvPr id="44" name="Connector: Elbow 43">
+            <a:extLst>
+              <a:ext uri="{FF2B5EF4-FFF2-40B4-BE49-F238E27FC236}">
+                <a16:creationId xmlns:a16="http://schemas.microsoft.com/office/drawing/2014/main" id="{6D3E62F8-1BC9-0CBC-87F4-648104710087}"/>
+              </a:ext>
+            </a:extLst>
+          </p:cNvPr>
+          <p:cNvCxnSpPr>
+            <a:stCxn id="14" idx="2"/>
+            <a:endCxn id="21" idx="0"/>
+          </p:cNvCxnSpPr>
+          <p:nvPr/>
+        </p:nvCxnSpPr>
+        <p:spPr>
+          <a:xfrm rot="16200000" flipH="1">
+            <a:off x="9781487" y="2809609"/>
+            <a:ext cx="304229" cy="199"/>
+          </a:xfrm>
+          <a:prstGeom prst="bentConnector3">
+            <a:avLst/>
+          </a:prstGeom>
+          <a:ln>
+            <a:headEnd type="triangle"/>
+            <a:tailEnd type="triangle"/>
+          </a:ln>
+        </p:spPr>
+        <p:style>
+          <a:lnRef idx="1">
+            <a:schemeClr val="accent1"/>
+          </a:lnRef>
+          <a:fillRef idx="0">
+            <a:schemeClr val="accent1"/>
+          </a:fillRef>
+          <a:effectRef idx="0">
+            <a:schemeClr val="accent1"/>
+          </a:effectRef>
+          <a:fontRef idx="minor">
+            <a:schemeClr val="tx1"/>
+          </a:fontRef>
+        </p:style>
+      </p:cxnSp>
+      <p:sp>
+        <p:nvSpPr>
+          <p:cNvPr id="49" name="Rectangle: Rounded Corners 48">
+            <a:extLst>
+              <a:ext uri="{FF2B5EF4-FFF2-40B4-BE49-F238E27FC236}">
+                <a16:creationId xmlns:a16="http://schemas.microsoft.com/office/drawing/2014/main" id="{586B1E2A-4994-7F82-85E3-251F8DA8550C}"/>
+              </a:ext>
+            </a:extLst>
+          </p:cNvPr>
+          <p:cNvSpPr/>
+          <p:nvPr/>
+        </p:nvSpPr>
+        <p:spPr>
+          <a:xfrm>
+            <a:off x="1237723" y="2961824"/>
+            <a:ext cx="1772806" cy="3195873"/>
+          </a:xfrm>
+          <a:prstGeom prst="roundRect">
+            <a:avLst/>
+          </a:prstGeom>
+          <a:ln>
+            <a:prstDash val="dash"/>
+          </a:ln>
+        </p:spPr>
+        <p:style>
+          <a:lnRef idx="2">
+            <a:schemeClr val="dk1"/>
+          </a:lnRef>
+          <a:fillRef idx="1">
+            <a:schemeClr val="lt1"/>
+          </a:fillRef>
+          <a:effectRef idx="0">
+            <a:schemeClr val="dk1"/>
+          </a:effectRef>
+          <a:fontRef idx="minor">
+            <a:schemeClr val="dk1"/>
+          </a:fontRef>
+        </p:style>
+        <p:txBody>
+          <a:bodyPr rtlCol="0" anchor="ctr"/>
+          <a:lstStyle/>
+          <a:p>
+            <a:pPr algn="ctr"/>
+            <a:endParaRPr lang="nb-NO" dirty="0"/>
+          </a:p>
+        </p:txBody>
+      </p:sp>
+      <p:sp>
+        <p:nvSpPr>
+          <p:cNvPr id="50" name="TextBox 49">
+            <a:extLst>
+              <a:ext uri="{FF2B5EF4-FFF2-40B4-BE49-F238E27FC236}">
+                <a16:creationId xmlns:a16="http://schemas.microsoft.com/office/drawing/2014/main" id="{2667E1B9-C132-903E-555B-0A5051DB51AF}"/>
+              </a:ext>
+            </a:extLst>
+          </p:cNvPr>
+          <p:cNvSpPr txBox="1"/>
+          <p:nvPr/>
+        </p:nvSpPr>
+        <p:spPr>
+          <a:xfrm>
+            <a:off x="1347607" y="3578806"/>
+            <a:ext cx="1502335" cy="415498"/>
+          </a:xfrm>
+          <a:prstGeom prst="rect">
+            <a:avLst/>
+          </a:prstGeom>
+          <a:noFill/>
+        </p:spPr>
+        <p:txBody>
+          <a:bodyPr wrap="none" rtlCol="0">
+            <a:spAutoFit/>
+          </a:bodyPr>
+          <a:lstStyle/>
+          <a:p>
+            <a:pPr algn="ctr"/>
+            <a:r>
+              <a:rPr lang="nb-NO" sz="1050" dirty="0"/>
+              <a:t>Discovery Relay</a:t>
+            </a:r>
+          </a:p>
+          <a:p>
+            <a:pPr algn="ctr"/>
+            <a:r>
+              <a:rPr lang="nb-NO" sz="1050" dirty="0">
+                <a:solidFill>
+                  <a:schemeClr val="bg2">
+                    <a:lumMod val="50000"/>
+                  </a:schemeClr>
+                </a:solidFill>
+              </a:rPr>
+              <a:t>discovery-af.nostria.app</a:t>
+            </a:r>
+          </a:p>
+        </p:txBody>
+      </p:sp>
+      <p:pic>
+        <p:nvPicPr>
+          <p:cNvPr id="51" name="Graphic 50">
+            <a:extLst>
+              <a:ext uri="{FF2B5EF4-FFF2-40B4-BE49-F238E27FC236}">
+                <a16:creationId xmlns:a16="http://schemas.microsoft.com/office/drawing/2014/main" id="{89193FB9-BE6A-8DE3-C426-126E00684340}"/>
+              </a:ext>
+            </a:extLst>
+          </p:cNvPr>
+          <p:cNvPicPr>
+            <a:picLocks noChangeAspect="1"/>
+          </p:cNvPicPr>
+          <p:nvPr/>
+        </p:nvPicPr>
+        <p:blipFill>
+          <a:blip r:embed="rId4">
+            <a:lum/>
+            <a:extLst>
+              <a:ext uri="{96DAC541-7B7A-43D3-8B79-37D633B846F1}">
+                <asvg:svgBlip xmlns:asvg="http://schemas.microsoft.com/office/drawing/2016/SVG/main" r:embed="rId5"/>
+              </a:ext>
+            </a:extLst>
+          </a:blip>
+          <a:srcRect/>
+          <a:stretch>
+            <a:fillRect/>
+          </a:stretch>
+        </p:blipFill>
+        <p:spPr bwMode="white">
+          <a:xfrm>
+            <a:off x="1901018" y="1454449"/>
+            <a:ext cx="439387" cy="439387"/>
+          </a:xfrm>
+          <a:prstGeom prst="rect">
+            <a:avLst/>
+          </a:prstGeom>
+          <a:ln>
+            <a:headEnd type="none"/>
+            <a:tailEnd type="none"/>
+          </a:ln>
+        </p:spPr>
+      </p:pic>
+      <p:sp>
+        <p:nvSpPr>
+          <p:cNvPr id="52" name="TextBox 51">
+            <a:extLst>
+              <a:ext uri="{FF2B5EF4-FFF2-40B4-BE49-F238E27FC236}">
+                <a16:creationId xmlns:a16="http://schemas.microsoft.com/office/drawing/2014/main" id="{DB9149E8-6064-D7B4-6F25-8E9468822B21}"/>
+              </a:ext>
+            </a:extLst>
+          </p:cNvPr>
+          <p:cNvSpPr txBox="1"/>
+          <p:nvPr/>
+        </p:nvSpPr>
+        <p:spPr>
+          <a:xfrm>
+            <a:off x="1340700" y="1918931"/>
+            <a:ext cx="1566454" cy="738664"/>
+          </a:xfrm>
+          <a:prstGeom prst="rect">
+            <a:avLst/>
+          </a:prstGeom>
+          <a:noFill/>
+        </p:spPr>
+        <p:txBody>
+          <a:bodyPr wrap="none" rtlCol="0">
+            <a:spAutoFit/>
+          </a:bodyPr>
+          <a:lstStyle/>
+          <a:p>
+            <a:pPr algn="ctr"/>
+            <a:r>
+              <a:rPr lang="nb-NO" sz="1050" dirty="0"/>
+              <a:t>Nostria in Cap Town</a:t>
+            </a:r>
+          </a:p>
+          <a:p>
+            <a:pPr algn="ctr"/>
+            <a:r>
+              <a:rPr lang="nb-NO" sz="1050" dirty="0">
+                <a:solidFill>
+                  <a:schemeClr val="bg2">
+                    <a:lumMod val="50000"/>
+                  </a:schemeClr>
+                </a:solidFill>
+              </a:rPr>
+              <a:t>When signing up, users is</a:t>
+            </a:r>
+          </a:p>
+          <a:p>
+            <a:pPr algn="ctr"/>
+            <a:r>
+              <a:rPr lang="nb-NO" sz="1050" dirty="0">
+                <a:solidFill>
+                  <a:schemeClr val="bg2">
+                    <a:lumMod val="50000"/>
+                  </a:schemeClr>
+                </a:solidFill>
+              </a:rPr>
+              <a:t>assigned user relay</a:t>
+            </a:r>
+          </a:p>
+          <a:p>
+            <a:pPr algn="ctr"/>
+            <a:r>
+              <a:rPr lang="nb-NO" sz="1050" dirty="0">
+                <a:solidFill>
+                  <a:schemeClr val="bg2">
+                    <a:lumMod val="50000"/>
+                  </a:schemeClr>
+                </a:solidFill>
+              </a:rPr>
+              <a:t>and media server</a:t>
+            </a:r>
+          </a:p>
+        </p:txBody>
+      </p:sp>
+      <p:pic>
+        <p:nvPicPr>
+          <p:cNvPr id="53" name="Graphic 52">
+            <a:extLst>
+              <a:ext uri="{FF2B5EF4-FFF2-40B4-BE49-F238E27FC236}">
+                <a16:creationId xmlns:a16="http://schemas.microsoft.com/office/drawing/2014/main" id="{AFF40B65-3893-44AE-3772-6FF8AFD15FB7}"/>
+              </a:ext>
+            </a:extLst>
+          </p:cNvPr>
+          <p:cNvPicPr>
+            <a:picLocks noChangeAspect="1"/>
+          </p:cNvPicPr>
+          <p:nvPr/>
+        </p:nvPicPr>
+        <p:blipFill>
+          <a:blip r:embed="rId6">
+            <a:lum/>
+            <a:extLst>
+              <a:ext uri="{96DAC541-7B7A-43D3-8B79-37D633B846F1}">
+                <asvg:svgBlip xmlns:asvg="http://schemas.microsoft.com/office/drawing/2016/SVG/main" r:embed="rId7"/>
+              </a:ext>
+            </a:extLst>
+          </a:blip>
+          <a:srcRect/>
+          <a:stretch>
+            <a:fillRect/>
+          </a:stretch>
+        </p:blipFill>
+        <p:spPr bwMode="white">
+          <a:xfrm>
+            <a:off x="1781274" y="3004767"/>
+            <a:ext cx="635000" cy="635000"/>
+          </a:xfrm>
+          <a:prstGeom prst="rect">
+            <a:avLst/>
+          </a:prstGeom>
+          <a:ln>
+            <a:headEnd type="none"/>
+            <a:tailEnd type="none"/>
+          </a:ln>
+        </p:spPr>
+      </p:pic>
+      <p:sp>
+        <p:nvSpPr>
+          <p:cNvPr id="54" name="TextBox 53">
+            <a:extLst>
+              <a:ext uri="{FF2B5EF4-FFF2-40B4-BE49-F238E27FC236}">
+                <a16:creationId xmlns:a16="http://schemas.microsoft.com/office/drawing/2014/main" id="{70CA2C02-FD2F-7E44-6B02-B932308230CB}"/>
+              </a:ext>
+            </a:extLst>
+          </p:cNvPr>
+          <p:cNvSpPr txBox="1"/>
+          <p:nvPr/>
+        </p:nvSpPr>
+        <p:spPr>
+          <a:xfrm>
+            <a:off x="1480725" y="4564407"/>
+            <a:ext cx="1220206" cy="415498"/>
+          </a:xfrm>
+          <a:prstGeom prst="rect">
+            <a:avLst/>
+          </a:prstGeom>
+          <a:noFill/>
+        </p:spPr>
+        <p:txBody>
+          <a:bodyPr wrap="none" rtlCol="0">
+            <a:spAutoFit/>
+          </a:bodyPr>
+          <a:lstStyle/>
+          <a:p>
+            <a:pPr algn="ctr"/>
+            <a:r>
+              <a:rPr lang="nb-NO" sz="1050" dirty="0"/>
+              <a:t>User Relays</a:t>
+            </a:r>
+          </a:p>
+          <a:p>
+            <a:pPr algn="ctr"/>
+            <a:r>
+              <a:rPr lang="nb-NO" sz="1050" dirty="0">
+                <a:solidFill>
+                  <a:schemeClr val="bg2">
+                    <a:lumMod val="50000"/>
+                  </a:schemeClr>
+                </a:solidFill>
+              </a:rPr>
+              <a:t>milo-af.nostria.app</a:t>
+            </a:r>
+          </a:p>
+        </p:txBody>
+      </p:sp>
+      <p:pic>
+        <p:nvPicPr>
+          <p:cNvPr id="55" name="Graphic 54">
+            <a:extLst>
+              <a:ext uri="{FF2B5EF4-FFF2-40B4-BE49-F238E27FC236}">
+                <a16:creationId xmlns:a16="http://schemas.microsoft.com/office/drawing/2014/main" id="{E1E9FCAA-84B2-1AD9-45A1-0BDD948A2E67}"/>
+              </a:ext>
+            </a:extLst>
+          </p:cNvPr>
+          <p:cNvPicPr>
+            <a:picLocks noChangeAspect="1"/>
+          </p:cNvPicPr>
+          <p:nvPr/>
+        </p:nvPicPr>
+        <p:blipFill>
+          <a:blip r:embed="rId8">
+            <a:lum/>
+            <a:extLst>
+              <a:ext uri="{96DAC541-7B7A-43D3-8B79-37D633B846F1}">
+                <asvg:svgBlip xmlns:asvg="http://schemas.microsoft.com/office/drawing/2016/SVG/main" r:embed="rId9"/>
+              </a:ext>
+            </a:extLst>
+          </a:blip>
+          <a:srcRect/>
+          <a:stretch>
+            <a:fillRect/>
+          </a:stretch>
+        </p:blipFill>
+        <p:spPr bwMode="white">
+          <a:xfrm>
+            <a:off x="1803783" y="5037066"/>
+            <a:ext cx="635000" cy="635000"/>
+          </a:xfrm>
+          <a:prstGeom prst="rect">
+            <a:avLst/>
+          </a:prstGeom>
+          <a:ln>
+            <a:headEnd type="none"/>
+            <a:tailEnd type="none"/>
+          </a:ln>
+        </p:spPr>
+      </p:pic>
+      <p:sp>
+        <p:nvSpPr>
+          <p:cNvPr id="56" name="TextBox 55">
+            <a:extLst>
+              <a:ext uri="{FF2B5EF4-FFF2-40B4-BE49-F238E27FC236}">
+                <a16:creationId xmlns:a16="http://schemas.microsoft.com/office/drawing/2014/main" id="{0DBF830F-E49F-366B-72EC-91AD0B7270F5}"/>
+              </a:ext>
+            </a:extLst>
+          </p:cNvPr>
+          <p:cNvSpPr txBox="1"/>
+          <p:nvPr/>
+        </p:nvSpPr>
+        <p:spPr>
+          <a:xfrm>
+            <a:off x="1509579" y="5577113"/>
+            <a:ext cx="1223413" cy="415498"/>
+          </a:xfrm>
+          <a:prstGeom prst="rect">
+            <a:avLst/>
+          </a:prstGeom>
+          <a:noFill/>
+        </p:spPr>
+        <p:txBody>
+          <a:bodyPr wrap="none" rtlCol="0">
+            <a:spAutoFit/>
+          </a:bodyPr>
+          <a:lstStyle/>
+          <a:p>
+            <a:pPr algn="ctr"/>
+            <a:r>
+              <a:rPr lang="nb-NO" sz="1050" dirty="0"/>
+              <a:t>Media Servers</a:t>
+            </a:r>
+          </a:p>
+          <a:p>
+            <a:pPr algn="ctr"/>
+            <a:r>
+              <a:rPr lang="nb-NO" sz="1050" dirty="0">
+                <a:solidFill>
+                  <a:schemeClr val="bg2">
+                    <a:lumMod val="50000"/>
+                  </a:schemeClr>
+                </a:solidFill>
+              </a:rPr>
+              <a:t>milo-af.nostria.app</a:t>
+            </a:r>
+          </a:p>
+        </p:txBody>
+      </p:sp>
+      <p:pic>
+        <p:nvPicPr>
+          <p:cNvPr id="57" name="Graphic 56">
+            <a:extLst>
+              <a:ext uri="{FF2B5EF4-FFF2-40B4-BE49-F238E27FC236}">
+                <a16:creationId xmlns:a16="http://schemas.microsoft.com/office/drawing/2014/main" id="{ABF87F99-3CEA-11F9-347C-C091B0BC8BEA}"/>
+              </a:ext>
+            </a:extLst>
+          </p:cNvPr>
+          <p:cNvPicPr>
+            <a:picLocks noChangeAspect="1"/>
+          </p:cNvPicPr>
+          <p:nvPr/>
+        </p:nvPicPr>
+        <p:blipFill>
+          <a:blip r:embed="rId8">
+            <a:lum/>
+            <a:extLst>
+              <a:ext uri="{96DAC541-7B7A-43D3-8B79-37D633B846F1}">
+                <asvg:svgBlip xmlns:asvg="http://schemas.microsoft.com/office/drawing/2016/SVG/main" r:embed="rId9"/>
+              </a:ext>
+            </a:extLst>
+          </a:blip>
+          <a:srcRect/>
+          <a:stretch>
+            <a:fillRect/>
+          </a:stretch>
+        </p:blipFill>
+        <p:spPr bwMode="white">
+          <a:xfrm>
+            <a:off x="1788650" y="4033401"/>
+            <a:ext cx="635000" cy="635000"/>
+          </a:xfrm>
+          <a:prstGeom prst="rect">
+            <a:avLst/>
+          </a:prstGeom>
+          <a:ln>
+            <a:headEnd type="none"/>
+            <a:tailEnd type="none"/>
+          </a:ln>
+        </p:spPr>
+      </p:pic>
+      <p:cxnSp>
+        <p:nvCxnSpPr>
+          <p:cNvPr id="58" name="Connector: Elbow 57">
+            <a:extLst>
+              <a:ext uri="{FF2B5EF4-FFF2-40B4-BE49-F238E27FC236}">
+                <a16:creationId xmlns:a16="http://schemas.microsoft.com/office/drawing/2014/main" id="{26E64D29-C3B3-33DD-57BA-B2370ACD1473}"/>
+              </a:ext>
+            </a:extLst>
+          </p:cNvPr>
+          <p:cNvCxnSpPr>
+            <a:stCxn id="52" idx="2"/>
+            <a:endCxn id="49" idx="0"/>
+          </p:cNvCxnSpPr>
+          <p:nvPr/>
+        </p:nvCxnSpPr>
+        <p:spPr>
+          <a:xfrm rot="16200000" flipH="1">
+            <a:off x="1971912" y="2809609"/>
+            <a:ext cx="304229" cy="199"/>
+          </a:xfrm>
+          <a:prstGeom prst="bentConnector3">
+            <a:avLst/>
+          </a:prstGeom>
+          <a:ln>
+            <a:headEnd type="triangle"/>
+            <a:tailEnd type="triangle"/>
+          </a:ln>
+        </p:spPr>
+        <p:style>
+          <a:lnRef idx="1">
+            <a:schemeClr val="accent1"/>
+          </a:lnRef>
+          <a:fillRef idx="0">
+            <a:schemeClr val="accent1"/>
+          </a:fillRef>
+          <a:effectRef idx="0">
+            <a:schemeClr val="accent1"/>
+          </a:effectRef>
+          <a:fontRef idx="minor">
+            <a:schemeClr val="tx1"/>
+          </a:fontRef>
+        </p:style>
+      </p:cxnSp>
+      <p:cxnSp>
+        <p:nvCxnSpPr>
+          <p:cNvPr id="62" name="Connector: Elbow 61">
+            <a:extLst>
+              <a:ext uri="{FF2B5EF4-FFF2-40B4-BE49-F238E27FC236}">
+                <a16:creationId xmlns:a16="http://schemas.microsoft.com/office/drawing/2014/main" id="{1ACE9B29-9325-3553-592A-AAE3DC769471}"/>
+              </a:ext>
+            </a:extLst>
+          </p:cNvPr>
+          <p:cNvCxnSpPr>
+            <a:cxnSpLocks/>
+            <a:stCxn id="13" idx="1"/>
+            <a:endCxn id="49" idx="3"/>
+          </p:cNvCxnSpPr>
+          <p:nvPr/>
+        </p:nvCxnSpPr>
+        <p:spPr>
+          <a:xfrm rot="10800000" flipV="1">
+            <a:off x="3010529" y="1674143"/>
+            <a:ext cx="6700064" cy="2885618"/>
+          </a:xfrm>
+          <a:prstGeom prst="bentConnector3">
+            <a:avLst>
+              <a:gd name="adj1" fmla="val 18822"/>
+            </a:avLst>
+          </a:prstGeom>
+          <a:ln>
+            <a:headEnd type="triangle"/>
+            <a:tailEnd type="triangle"/>
+          </a:ln>
+        </p:spPr>
+        <p:style>
+          <a:lnRef idx="1">
+            <a:schemeClr val="accent1"/>
+          </a:lnRef>
+          <a:fillRef idx="0">
+            <a:schemeClr val="accent1"/>
+          </a:fillRef>
+          <a:effectRef idx="0">
+            <a:schemeClr val="accent1"/>
+          </a:effectRef>
+          <a:fontRef idx="minor">
+            <a:schemeClr val="tx1"/>
+          </a:fontRef>
+        </p:style>
+      </p:cxnSp>
+      <p:sp>
+        <p:nvSpPr>
+          <p:cNvPr id="64" name="TextBox 63">
+            <a:extLst>
+              <a:ext uri="{FF2B5EF4-FFF2-40B4-BE49-F238E27FC236}">
+                <a16:creationId xmlns:a16="http://schemas.microsoft.com/office/drawing/2014/main" id="{BEC69795-19BE-8C4C-0D30-C1BEB7C48A62}"/>
+              </a:ext>
+            </a:extLst>
+          </p:cNvPr>
+          <p:cNvSpPr txBox="1"/>
+          <p:nvPr/>
+        </p:nvSpPr>
+        <p:spPr>
+          <a:xfrm>
+            <a:off x="4025367" y="4619497"/>
+            <a:ext cx="4007094" cy="938719"/>
+          </a:xfrm>
+          <a:prstGeom prst="rect">
+            <a:avLst/>
+          </a:prstGeom>
+          <a:noFill/>
+        </p:spPr>
+        <p:txBody>
+          <a:bodyPr wrap="square" rtlCol="0">
+            <a:spAutoFit/>
+          </a:bodyPr>
+          <a:lstStyle/>
+          <a:p>
+            <a:r>
+              <a:rPr lang="nb-NO" sz="1100" dirty="0"/>
+              <a:t>4. </a:t>
+            </a:r>
+            <a:r>
+              <a:rPr lang="en-US" sz="1100" b="0" i="0" dirty="0">
+                <a:effectLst/>
+                <a:latin typeface="gg sans"/>
+              </a:rPr>
+              <a:t>Global Relay Distribution</a:t>
+            </a:r>
+          </a:p>
+          <a:p>
+            <a:r>
+              <a:rPr lang="nb-NO" sz="1100" dirty="0">
+                <a:solidFill>
+                  <a:schemeClr val="bg2">
+                    <a:lumMod val="50000"/>
+                  </a:schemeClr>
+                </a:solidFill>
+              </a:rPr>
+              <a:t>Individuals with large amount of followers, can subscribe to global </a:t>
+            </a:r>
+            <a:r>
+              <a:rPr lang="en-US" sz="1100" dirty="0">
+                <a:solidFill>
+                  <a:schemeClr val="bg2">
+                    <a:lumMod val="50000"/>
+                  </a:schemeClr>
+                </a:solidFill>
+              </a:rPr>
+              <a:t>relay distribution</a:t>
+            </a:r>
+            <a:r>
+              <a:rPr lang="nb-NO" sz="1100" dirty="0">
+                <a:solidFill>
+                  <a:schemeClr val="bg2">
+                    <a:lumMod val="50000"/>
+                  </a:schemeClr>
+                </a:solidFill>
+              </a:rPr>
+              <a:t>, giving their followers the best possible experience by being able to retireve their posts and media from a geographically closer location.</a:t>
+            </a:r>
+          </a:p>
+        </p:txBody>
+      </p:sp>
+    </p:spTree>
+    <p:extLst>
+      <p:ext uri="{BB962C8B-B14F-4D97-AF65-F5344CB8AC3E}">
+        <p14:creationId xmlns:p14="http://schemas.microsoft.com/office/powerpoint/2010/main" val="3621950426"/>
+      </p:ext>
+    </p:extLst>
+  </p:cSld>
+  <p:clrMapOvr>
+    <a:masterClrMapping/>
+  </p:clrMapOvr>
+</p:sld>
+</file>
+
 <file path=ppt/theme/theme1.xml><?xml version="1.0" encoding="utf-8"?>
 <a:theme xmlns:a="http://schemas.openxmlformats.org/drawingml/2006/main" name="Office Theme">
   <a:themeElements>

</xml_diff>

<commit_message>
Refactor Bicep deployment scripts and parameter files for multi-region support
- Updated main.bicep to include parameters for current region, relay and media counts per region, and server names.
- Introduced region mapping module to map region codes to Azure locations.
- Enhanced deploy.ps1 script to read parameters from a specified file and support multiple regions.
- Added new parameter files for Bicep deployments.
- Removed unused app deployments and certificates for website, main, and metadata apps.
- Improved output handling for deployment results and added what-if deployment option.
- Created deploy-all-regions.ps1 script to facilitate deployment across multiple regions.
- Updated documentation to reflect changes in infrastructure and deployment processes.
</commit_message>
<xml_diff>
--- a/docs/nostria-infrastructure.pptx
+++ b/docs/nostria-infrastructure.pptx
@@ -6,8 +6,7 @@
   </p:sldMasterIdLst>
   <p:sldIdLst>
     <p:sldId id="257" r:id="rId2"/>
-    <p:sldId id="258" r:id="rId3"/>
-    <p:sldId id="259" r:id="rId4"/>
+    <p:sldId id="259" r:id="rId3"/>
   </p:sldIdLst>
   <p:sldSz cx="12192000" cy="6858000"/>
   <p:notesSz cx="6858000" cy="9144000"/>
@@ -5831,1414 +5830,6 @@
         <p:cNvPr id="1" name="">
           <a:extLst>
             <a:ext uri="{FF2B5EF4-FFF2-40B4-BE49-F238E27FC236}">
-              <a16:creationId xmlns:a16="http://schemas.microsoft.com/office/drawing/2014/main" id="{B7C047F6-12B7-6C79-08DE-C42F4FF5ED4A}"/>
-            </a:ext>
-          </a:extLst>
-        </p:cNvPr>
-        <p:cNvGrpSpPr/>
-        <p:nvPr/>
-      </p:nvGrpSpPr>
-      <p:grpSpPr>
-        <a:xfrm>
-          <a:off x="0" y="0"/>
-          <a:ext cx="0" cy="0"/>
-          <a:chOff x="0" y="0"/>
-          <a:chExt cx="0" cy="0"/>
-        </a:xfrm>
-      </p:grpSpPr>
-      <p:sp>
-        <p:nvSpPr>
-          <p:cNvPr id="11" name="Rectangle: Rounded Corners 10">
-            <a:extLst>
-              <a:ext uri="{FF2B5EF4-FFF2-40B4-BE49-F238E27FC236}">
-                <a16:creationId xmlns:a16="http://schemas.microsoft.com/office/drawing/2014/main" id="{E5A185D2-3F1A-2927-1B61-99FEAEEF9AE2}"/>
-              </a:ext>
-            </a:extLst>
-          </p:cNvPr>
-          <p:cNvSpPr/>
-          <p:nvPr/>
-        </p:nvSpPr>
-        <p:spPr>
-          <a:xfrm>
-            <a:off x="1915910" y="1385180"/>
-            <a:ext cx="2326928" cy="3195873"/>
-          </a:xfrm>
-          <a:prstGeom prst="roundRect">
-            <a:avLst/>
-          </a:prstGeom>
-          <a:ln>
-            <a:prstDash val="dash"/>
-          </a:ln>
-        </p:spPr>
-        <p:style>
-          <a:lnRef idx="2">
-            <a:schemeClr val="dk1"/>
-          </a:lnRef>
-          <a:fillRef idx="1">
-            <a:schemeClr val="lt1"/>
-          </a:fillRef>
-          <a:effectRef idx="0">
-            <a:schemeClr val="dk1"/>
-          </a:effectRef>
-          <a:fontRef idx="minor">
-            <a:schemeClr val="dk1"/>
-          </a:fontRef>
-        </p:style>
-        <p:txBody>
-          <a:bodyPr rtlCol="0" anchor="ctr"/>
-          <a:lstStyle/>
-          <a:p>
-            <a:pPr algn="ctr"/>
-            <a:endParaRPr lang="nb-NO" dirty="0"/>
-          </a:p>
-        </p:txBody>
-      </p:sp>
-      <p:sp>
-        <p:nvSpPr>
-          <p:cNvPr id="6" name="Rectangle: Rounded Corners 5">
-            <a:extLst>
-              <a:ext uri="{FF2B5EF4-FFF2-40B4-BE49-F238E27FC236}">
-                <a16:creationId xmlns:a16="http://schemas.microsoft.com/office/drawing/2014/main" id="{2F4ECC7D-1DD1-4D16-4F3F-95E1D1DA9E77}"/>
-              </a:ext>
-            </a:extLst>
-          </p:cNvPr>
-          <p:cNvSpPr/>
-          <p:nvPr/>
-        </p:nvSpPr>
-        <p:spPr>
-          <a:xfrm>
-            <a:off x="6151633" y="4710183"/>
-            <a:ext cx="1563028" cy="742347"/>
-          </a:xfrm>
-          <a:prstGeom prst="roundRect">
-            <a:avLst/>
-          </a:prstGeom>
-          <a:ln>
-            <a:prstDash val="dash"/>
-          </a:ln>
-        </p:spPr>
-        <p:style>
-          <a:lnRef idx="2">
-            <a:schemeClr val="dk1"/>
-          </a:lnRef>
-          <a:fillRef idx="1">
-            <a:schemeClr val="lt1"/>
-          </a:fillRef>
-          <a:effectRef idx="0">
-            <a:schemeClr val="dk1"/>
-          </a:effectRef>
-          <a:fontRef idx="minor">
-            <a:schemeClr val="dk1"/>
-          </a:fontRef>
-        </p:style>
-        <p:txBody>
-          <a:bodyPr rtlCol="0" anchor="ctr"/>
-          <a:lstStyle/>
-          <a:p>
-            <a:pPr algn="ctr"/>
-            <a:endParaRPr lang="nb-NO" dirty="0"/>
-          </a:p>
-        </p:txBody>
-      </p:sp>
-      <p:pic>
-        <p:nvPicPr>
-          <p:cNvPr id="15" name="Graphic 14">
-            <a:extLst>
-              <a:ext uri="{FF2B5EF4-FFF2-40B4-BE49-F238E27FC236}">
-                <a16:creationId xmlns:a16="http://schemas.microsoft.com/office/drawing/2014/main" id="{8E740773-C6FC-C109-FC4C-547DCCA93C0D}"/>
-              </a:ext>
-            </a:extLst>
-          </p:cNvPr>
-          <p:cNvPicPr>
-            <a:picLocks noChangeAspect="1"/>
-          </p:cNvPicPr>
-          <p:nvPr/>
-        </p:nvPicPr>
-        <p:blipFill>
-          <a:blip r:embed="rId2">
-            <a:lum/>
-            <a:extLst>
-              <a:ext uri="{96DAC541-7B7A-43D3-8B79-37D633B846F1}">
-                <asvg:svgBlip xmlns:asvg="http://schemas.microsoft.com/office/drawing/2016/SVG/main" r:embed="rId3"/>
-              </a:ext>
-            </a:extLst>
-          </a:blip>
-          <a:srcRect/>
-          <a:stretch>
-            <a:fillRect/>
-          </a:stretch>
-        </p:blipFill>
-        <p:spPr bwMode="white">
-          <a:xfrm>
-            <a:off x="5133693" y="1467513"/>
-            <a:ext cx="635000" cy="635000"/>
-          </a:xfrm>
-          <a:prstGeom prst="rect">
-            <a:avLst/>
-          </a:prstGeom>
-          <a:ln>
-            <a:headEnd type="none"/>
-            <a:tailEnd type="none"/>
-          </a:ln>
-        </p:spPr>
-      </p:pic>
-      <p:sp>
-        <p:nvSpPr>
-          <p:cNvPr id="16" name="TextBox 15">
-            <a:extLst>
-              <a:ext uri="{FF2B5EF4-FFF2-40B4-BE49-F238E27FC236}">
-                <a16:creationId xmlns:a16="http://schemas.microsoft.com/office/drawing/2014/main" id="{EA9523D6-358D-D4C0-2114-04DF99A108CE}"/>
-              </a:ext>
-            </a:extLst>
-          </p:cNvPr>
-          <p:cNvSpPr txBox="1"/>
-          <p:nvPr/>
-        </p:nvSpPr>
-        <p:spPr>
-          <a:xfrm>
-            <a:off x="4746513" y="2027516"/>
-            <a:ext cx="1409360" cy="430887"/>
-          </a:xfrm>
-          <a:prstGeom prst="rect">
-            <a:avLst/>
-          </a:prstGeom>
-          <a:noFill/>
-        </p:spPr>
-        <p:txBody>
-          <a:bodyPr wrap="none" rtlCol="0">
-            <a:spAutoFit/>
-          </a:bodyPr>
-          <a:lstStyle/>
-          <a:p>
-            <a:pPr algn="ctr"/>
-            <a:r>
-              <a:rPr lang="nb-NO" sz="1100" dirty="0"/>
-              <a:t>Discovery Relay</a:t>
-            </a:r>
-          </a:p>
-          <a:p>
-            <a:pPr algn="ctr"/>
-            <a:r>
-              <a:rPr lang="nb-NO" sz="1100" dirty="0">
-                <a:solidFill>
-                  <a:schemeClr val="bg2">
-                    <a:lumMod val="50000"/>
-                  </a:schemeClr>
-                </a:solidFill>
-              </a:rPr>
-              <a:t>discovery.nostria.app</a:t>
-            </a:r>
-          </a:p>
-        </p:txBody>
-      </p:sp>
-      <p:pic>
-        <p:nvPicPr>
-          <p:cNvPr id="22" name="Graphic 21">
-            <a:extLst>
-              <a:ext uri="{FF2B5EF4-FFF2-40B4-BE49-F238E27FC236}">
-                <a16:creationId xmlns:a16="http://schemas.microsoft.com/office/drawing/2014/main" id="{7DA475A8-A735-60DB-DCCC-89FDDB8E789F}"/>
-              </a:ext>
-            </a:extLst>
-          </p:cNvPr>
-          <p:cNvPicPr>
-            <a:picLocks noChangeAspect="1"/>
-          </p:cNvPicPr>
-          <p:nvPr/>
-        </p:nvPicPr>
-        <p:blipFill>
-          <a:blip r:embed="rId4">
-            <a:lum/>
-            <a:extLst>
-              <a:ext uri="{96DAC541-7B7A-43D3-8B79-37D633B846F1}">
-                <asvg:svgBlip xmlns:asvg="http://schemas.microsoft.com/office/drawing/2016/SVG/main" r:embed="rId5"/>
-              </a:ext>
-            </a:extLst>
-          </a:blip>
-          <a:srcRect/>
-          <a:stretch>
-            <a:fillRect/>
-          </a:stretch>
-        </p:blipFill>
-        <p:spPr bwMode="white">
-          <a:xfrm>
-            <a:off x="2764485" y="1518298"/>
-            <a:ext cx="635000" cy="635000"/>
-          </a:xfrm>
-          <a:prstGeom prst="rect">
-            <a:avLst/>
-          </a:prstGeom>
-          <a:ln>
-            <a:headEnd type="none"/>
-            <a:tailEnd type="none"/>
-          </a:ln>
-        </p:spPr>
-      </p:pic>
-      <p:sp>
-        <p:nvSpPr>
-          <p:cNvPr id="29" name="TextBox 28">
-            <a:extLst>
-              <a:ext uri="{FF2B5EF4-FFF2-40B4-BE49-F238E27FC236}">
-                <a16:creationId xmlns:a16="http://schemas.microsoft.com/office/drawing/2014/main" id="{0FD4DF38-E43B-D2AA-41CE-95F6FF7E34B4}"/>
-              </a:ext>
-            </a:extLst>
-          </p:cNvPr>
-          <p:cNvSpPr txBox="1"/>
-          <p:nvPr/>
-        </p:nvSpPr>
-        <p:spPr>
-          <a:xfrm>
-            <a:off x="3092162" y="3524182"/>
-            <a:ext cx="1096774" cy="938719"/>
-          </a:xfrm>
-          <a:prstGeom prst="rect">
-            <a:avLst/>
-          </a:prstGeom>
-          <a:noFill/>
-        </p:spPr>
-        <p:txBody>
-          <a:bodyPr wrap="none" rtlCol="0">
-            <a:spAutoFit/>
-          </a:bodyPr>
-          <a:lstStyle/>
-          <a:p>
-            <a:pPr algn="ctr"/>
-            <a:r>
-              <a:rPr lang="nb-NO" sz="1100" dirty="0"/>
-              <a:t>User Relays</a:t>
-            </a:r>
-          </a:p>
-          <a:p>
-            <a:pPr algn="ctr"/>
-            <a:r>
-              <a:rPr lang="nb-NO" sz="1100" dirty="0">
-                <a:solidFill>
-                  <a:schemeClr val="bg2">
-                    <a:lumMod val="50000"/>
-                  </a:schemeClr>
-                </a:solidFill>
-              </a:rPr>
-              <a:t>ribo.nostria.app</a:t>
-            </a:r>
-          </a:p>
-          <a:p>
-            <a:pPr algn="ctr"/>
-            <a:r>
-              <a:rPr lang="nb-NO" sz="1100" dirty="0">
-                <a:solidFill>
-                  <a:schemeClr val="bg2">
-                    <a:lumMod val="50000"/>
-                  </a:schemeClr>
-                </a:solidFill>
-              </a:rPr>
-              <a:t>rilo.nostria.app</a:t>
-            </a:r>
-          </a:p>
-          <a:p>
-            <a:pPr algn="ctr"/>
-            <a:r>
-              <a:rPr lang="nb-NO" sz="1100" dirty="0">
-                <a:solidFill>
-                  <a:schemeClr val="bg2">
-                    <a:lumMod val="50000"/>
-                  </a:schemeClr>
-                </a:solidFill>
-              </a:rPr>
-              <a:t>rifu.nostria.app</a:t>
-            </a:r>
-          </a:p>
-          <a:p>
-            <a:pPr algn="ctr"/>
-            <a:r>
-              <a:rPr lang="nb-NO" sz="1100" dirty="0">
-                <a:solidFill>
-                  <a:schemeClr val="bg2">
-                    <a:lumMod val="50000"/>
-                  </a:schemeClr>
-                </a:solidFill>
-              </a:rPr>
-              <a:t>...</a:t>
-            </a:r>
-          </a:p>
-        </p:txBody>
-      </p:sp>
-      <p:pic>
-        <p:nvPicPr>
-          <p:cNvPr id="30" name="Graphic 29">
-            <a:extLst>
-              <a:ext uri="{FF2B5EF4-FFF2-40B4-BE49-F238E27FC236}">
-                <a16:creationId xmlns:a16="http://schemas.microsoft.com/office/drawing/2014/main" id="{6D6F7EFA-F708-134F-79F3-91C6A03292AB}"/>
-              </a:ext>
-            </a:extLst>
-          </p:cNvPr>
-          <p:cNvPicPr>
-            <a:picLocks noChangeAspect="1"/>
-          </p:cNvPicPr>
-          <p:nvPr/>
-        </p:nvPicPr>
-        <p:blipFill>
-          <a:blip r:embed="rId6">
-            <a:lum/>
-            <a:extLst>
-              <a:ext uri="{96DAC541-7B7A-43D3-8B79-37D633B846F1}">
-                <asvg:svgBlip xmlns:asvg="http://schemas.microsoft.com/office/drawing/2016/SVG/main" r:embed="rId7"/>
-              </a:ext>
-            </a:extLst>
-          </a:blip>
-          <a:srcRect/>
-          <a:stretch>
-            <a:fillRect/>
-          </a:stretch>
-        </p:blipFill>
-        <p:spPr bwMode="white">
-          <a:xfrm>
-            <a:off x="2223589" y="2963350"/>
-            <a:ext cx="635000" cy="635000"/>
-          </a:xfrm>
-          <a:prstGeom prst="rect">
-            <a:avLst/>
-          </a:prstGeom>
-          <a:ln>
-            <a:headEnd type="none"/>
-            <a:tailEnd type="none"/>
-          </a:ln>
-        </p:spPr>
-      </p:pic>
-      <p:sp>
-        <p:nvSpPr>
-          <p:cNvPr id="32" name="TextBox 31">
-            <a:extLst>
-              <a:ext uri="{FF2B5EF4-FFF2-40B4-BE49-F238E27FC236}">
-                <a16:creationId xmlns:a16="http://schemas.microsoft.com/office/drawing/2014/main" id="{71946816-5BA9-471E-D7A8-C19705837435}"/>
-              </a:ext>
-            </a:extLst>
-          </p:cNvPr>
-          <p:cNvSpPr txBox="1"/>
-          <p:nvPr/>
-        </p:nvSpPr>
-        <p:spPr>
-          <a:xfrm>
-            <a:off x="1961443" y="3503397"/>
-            <a:ext cx="1159292" cy="938719"/>
-          </a:xfrm>
-          <a:prstGeom prst="rect">
-            <a:avLst/>
-          </a:prstGeom>
-          <a:noFill/>
-        </p:spPr>
-        <p:txBody>
-          <a:bodyPr wrap="none" rtlCol="0">
-            <a:spAutoFit/>
-          </a:bodyPr>
-          <a:lstStyle/>
-          <a:p>
-            <a:pPr algn="ctr"/>
-            <a:r>
-              <a:rPr lang="nb-NO" sz="1100" dirty="0"/>
-              <a:t>Media Servers</a:t>
-            </a:r>
-          </a:p>
-          <a:p>
-            <a:pPr algn="ctr"/>
-            <a:r>
-              <a:rPr lang="nb-NO" sz="1100" dirty="0">
-                <a:solidFill>
-                  <a:schemeClr val="bg2">
-                    <a:lumMod val="50000"/>
-                  </a:schemeClr>
-                </a:solidFill>
-              </a:rPr>
-              <a:t>mibo.nostria.app</a:t>
-            </a:r>
-          </a:p>
-          <a:p>
-            <a:pPr algn="ctr"/>
-            <a:r>
-              <a:rPr lang="nb-NO" sz="1100" dirty="0">
-                <a:solidFill>
-                  <a:schemeClr val="bg2">
-                    <a:lumMod val="50000"/>
-                  </a:schemeClr>
-                </a:solidFill>
-              </a:rPr>
-              <a:t>milo.nostria.app</a:t>
-            </a:r>
-          </a:p>
-          <a:p>
-            <a:pPr algn="ctr"/>
-            <a:r>
-              <a:rPr lang="nb-NO" sz="1100" dirty="0">
-                <a:solidFill>
-                  <a:schemeClr val="bg2">
-                    <a:lumMod val="50000"/>
-                  </a:schemeClr>
-                </a:solidFill>
-              </a:rPr>
-              <a:t>mifu.nostria.app</a:t>
-            </a:r>
-          </a:p>
-          <a:p>
-            <a:pPr algn="ctr"/>
-            <a:r>
-              <a:rPr lang="nb-NO" sz="1100" dirty="0">
-                <a:solidFill>
-                  <a:schemeClr val="bg2">
-                    <a:lumMod val="50000"/>
-                  </a:schemeClr>
-                </a:solidFill>
-              </a:rPr>
-              <a:t>...</a:t>
-            </a:r>
-          </a:p>
-        </p:txBody>
-      </p:sp>
-      <p:pic>
-        <p:nvPicPr>
-          <p:cNvPr id="33" name="Graphic 32">
-            <a:extLst>
-              <a:ext uri="{FF2B5EF4-FFF2-40B4-BE49-F238E27FC236}">
-                <a16:creationId xmlns:a16="http://schemas.microsoft.com/office/drawing/2014/main" id="{119D3701-4BBB-9698-00C5-3DD030D18089}"/>
-              </a:ext>
-            </a:extLst>
-          </p:cNvPr>
-          <p:cNvPicPr>
-            <a:picLocks noChangeAspect="1"/>
-          </p:cNvPicPr>
-          <p:nvPr/>
-        </p:nvPicPr>
-        <p:blipFill>
-          <a:blip r:embed="rId6">
-            <a:lum/>
-            <a:extLst>
-              <a:ext uri="{96DAC541-7B7A-43D3-8B79-37D633B846F1}">
-                <asvg:svgBlip xmlns:asvg="http://schemas.microsoft.com/office/drawing/2016/SVG/main" r:embed="rId7"/>
-              </a:ext>
-            </a:extLst>
-          </a:blip>
-          <a:srcRect/>
-          <a:stretch>
-            <a:fillRect/>
-          </a:stretch>
-        </p:blipFill>
-        <p:spPr bwMode="white">
-          <a:xfrm>
-            <a:off x="3338372" y="2993176"/>
-            <a:ext cx="635000" cy="635000"/>
-          </a:xfrm>
-          <a:prstGeom prst="rect">
-            <a:avLst/>
-          </a:prstGeom>
-          <a:ln>
-            <a:headEnd type="none"/>
-            <a:tailEnd type="none"/>
-          </a:ln>
-        </p:spPr>
-      </p:pic>
-      <p:pic>
-        <p:nvPicPr>
-          <p:cNvPr id="34" name="Graphic 33">
-            <a:extLst>
-              <a:ext uri="{FF2B5EF4-FFF2-40B4-BE49-F238E27FC236}">
-                <a16:creationId xmlns:a16="http://schemas.microsoft.com/office/drawing/2014/main" id="{79F89F3A-C95B-E2DB-D0FA-7F1ADB0F5798}"/>
-              </a:ext>
-            </a:extLst>
-          </p:cNvPr>
-          <p:cNvPicPr>
-            <a:picLocks noChangeAspect="1"/>
-          </p:cNvPicPr>
-          <p:nvPr/>
-        </p:nvPicPr>
-        <p:blipFill>
-          <a:blip r:embed="rId6">
-            <a:lum/>
-            <a:extLst>
-              <a:ext uri="{96DAC541-7B7A-43D3-8B79-37D633B846F1}">
-                <asvg:svgBlip xmlns:asvg="http://schemas.microsoft.com/office/drawing/2016/SVG/main" r:embed="rId7"/>
-              </a:ext>
-            </a:extLst>
-          </a:blip>
-          <a:srcRect/>
-          <a:stretch>
-            <a:fillRect/>
-          </a:stretch>
-        </p:blipFill>
-        <p:spPr bwMode="white">
-          <a:xfrm>
-            <a:off x="7259651" y="4771092"/>
-            <a:ext cx="317500" cy="317500"/>
-          </a:xfrm>
-          <a:prstGeom prst="rect">
-            <a:avLst/>
-          </a:prstGeom>
-          <a:ln>
-            <a:headEnd type="none"/>
-            <a:tailEnd type="none"/>
-          </a:ln>
-        </p:spPr>
-      </p:pic>
-      <p:pic>
-        <p:nvPicPr>
-          <p:cNvPr id="35" name="Graphic 34">
-            <a:extLst>
-              <a:ext uri="{FF2B5EF4-FFF2-40B4-BE49-F238E27FC236}">
-                <a16:creationId xmlns:a16="http://schemas.microsoft.com/office/drawing/2014/main" id="{778DE81E-AE59-404E-C0D4-F632941CD2A7}"/>
-              </a:ext>
-            </a:extLst>
-          </p:cNvPr>
-          <p:cNvPicPr>
-            <a:picLocks noChangeAspect="1"/>
-          </p:cNvPicPr>
-          <p:nvPr/>
-        </p:nvPicPr>
-        <p:blipFill>
-          <a:blip r:embed="rId6">
-            <a:lum/>
-            <a:extLst>
-              <a:ext uri="{96DAC541-7B7A-43D3-8B79-37D633B846F1}">
-                <asvg:svgBlip xmlns:asvg="http://schemas.microsoft.com/office/drawing/2016/SVG/main" r:embed="rId7"/>
-              </a:ext>
-            </a:extLst>
-          </a:blip>
-          <a:srcRect/>
-          <a:stretch>
-            <a:fillRect/>
-          </a:stretch>
-        </p:blipFill>
-        <p:spPr bwMode="white">
-          <a:xfrm>
-            <a:off x="7259578" y="5080574"/>
-            <a:ext cx="317500" cy="317500"/>
-          </a:xfrm>
-          <a:prstGeom prst="rect">
-            <a:avLst/>
-          </a:prstGeom>
-          <a:ln>
-            <a:headEnd type="none"/>
-            <a:tailEnd type="none"/>
-          </a:ln>
-        </p:spPr>
-      </p:pic>
-      <p:pic>
-        <p:nvPicPr>
-          <p:cNvPr id="36" name="Graphic 35">
-            <a:extLst>
-              <a:ext uri="{FF2B5EF4-FFF2-40B4-BE49-F238E27FC236}">
-                <a16:creationId xmlns:a16="http://schemas.microsoft.com/office/drawing/2014/main" id="{17381ED4-7749-4A0D-3DB5-6B18EA9EA62A}"/>
-              </a:ext>
-            </a:extLst>
-          </p:cNvPr>
-          <p:cNvPicPr>
-            <a:picLocks noChangeAspect="1"/>
-          </p:cNvPicPr>
-          <p:nvPr/>
-        </p:nvPicPr>
-        <p:blipFill>
-          <a:blip r:embed="rId6">
-            <a:lum/>
-            <a:extLst>
-              <a:ext uri="{96DAC541-7B7A-43D3-8B79-37D633B846F1}">
-                <asvg:svgBlip xmlns:asvg="http://schemas.microsoft.com/office/drawing/2016/SVG/main" r:embed="rId7"/>
-              </a:ext>
-            </a:extLst>
-          </a:blip>
-          <a:srcRect/>
-          <a:stretch>
-            <a:fillRect/>
-          </a:stretch>
-        </p:blipFill>
-        <p:spPr bwMode="white">
-          <a:xfrm>
-            <a:off x="6812090" y="4753007"/>
-            <a:ext cx="317500" cy="317500"/>
-          </a:xfrm>
-          <a:prstGeom prst="rect">
-            <a:avLst/>
-          </a:prstGeom>
-          <a:ln>
-            <a:headEnd type="none"/>
-            <a:tailEnd type="none"/>
-          </a:ln>
-        </p:spPr>
-      </p:pic>
-      <p:pic>
-        <p:nvPicPr>
-          <p:cNvPr id="37" name="Graphic 36">
-            <a:extLst>
-              <a:ext uri="{FF2B5EF4-FFF2-40B4-BE49-F238E27FC236}">
-                <a16:creationId xmlns:a16="http://schemas.microsoft.com/office/drawing/2014/main" id="{1744093A-6E5E-77A4-E4F6-923184A613CC}"/>
-              </a:ext>
-            </a:extLst>
-          </p:cNvPr>
-          <p:cNvPicPr>
-            <a:picLocks noChangeAspect="1"/>
-          </p:cNvPicPr>
-          <p:nvPr/>
-        </p:nvPicPr>
-        <p:blipFill>
-          <a:blip r:embed="rId6">
-            <a:lum/>
-            <a:extLst>
-              <a:ext uri="{96DAC541-7B7A-43D3-8B79-37D633B846F1}">
-                <asvg:svgBlip xmlns:asvg="http://schemas.microsoft.com/office/drawing/2016/SVG/main" r:embed="rId7"/>
-              </a:ext>
-            </a:extLst>
-          </a:blip>
-          <a:srcRect/>
-          <a:stretch>
-            <a:fillRect/>
-          </a:stretch>
-        </p:blipFill>
-        <p:spPr bwMode="white">
-          <a:xfrm>
-            <a:off x="6830990" y="5056370"/>
-            <a:ext cx="317500" cy="317500"/>
-          </a:xfrm>
-          <a:prstGeom prst="rect">
-            <a:avLst/>
-          </a:prstGeom>
-          <a:ln>
-            <a:headEnd type="none"/>
-            <a:tailEnd type="none"/>
-          </a:ln>
-        </p:spPr>
-      </p:pic>
-      <p:pic>
-        <p:nvPicPr>
-          <p:cNvPr id="110" name="Graphic 109">
-            <a:extLst>
-              <a:ext uri="{FF2B5EF4-FFF2-40B4-BE49-F238E27FC236}">
-                <a16:creationId xmlns:a16="http://schemas.microsoft.com/office/drawing/2014/main" id="{9215E189-B434-2E09-1B73-7E8CF7F885A9}"/>
-              </a:ext>
-            </a:extLst>
-          </p:cNvPr>
-          <p:cNvPicPr>
-            <a:picLocks noChangeAspect="1"/>
-          </p:cNvPicPr>
-          <p:nvPr/>
-        </p:nvPicPr>
-        <p:blipFill>
-          <a:blip r:embed="rId8">
-            <a:extLst>
-              <a:ext uri="{96DAC541-7B7A-43D3-8B79-37D633B846F1}">
-                <asvg:svgBlip xmlns:asvg="http://schemas.microsoft.com/office/drawing/2016/SVG/main" r:embed="rId9"/>
-              </a:ext>
-            </a:extLst>
-          </a:blip>
-          <a:stretch>
-            <a:fillRect/>
-          </a:stretch>
-        </p:blipFill>
-        <p:spPr>
-          <a:xfrm>
-            <a:off x="3399485" y="215239"/>
-            <a:ext cx="631843" cy="631843"/>
-          </a:xfrm>
-          <a:prstGeom prst="rect">
-            <a:avLst/>
-          </a:prstGeom>
-        </p:spPr>
-      </p:pic>
-      <p:sp>
-        <p:nvSpPr>
-          <p:cNvPr id="111" name="TextBox 110">
-            <a:extLst>
-              <a:ext uri="{FF2B5EF4-FFF2-40B4-BE49-F238E27FC236}">
-                <a16:creationId xmlns:a16="http://schemas.microsoft.com/office/drawing/2014/main" id="{5BF055A7-8A45-E95C-3695-C0A8FC23AECD}"/>
-              </a:ext>
-            </a:extLst>
-          </p:cNvPr>
-          <p:cNvSpPr txBox="1"/>
-          <p:nvPr/>
-        </p:nvSpPr>
-        <p:spPr>
-          <a:xfrm>
-            <a:off x="4134938" y="269550"/>
-            <a:ext cx="3914983" cy="523220"/>
-          </a:xfrm>
-          <a:prstGeom prst="rect">
-            <a:avLst/>
-          </a:prstGeom>
-          <a:noFill/>
-        </p:spPr>
-        <p:txBody>
-          <a:bodyPr wrap="none" rtlCol="0">
-            <a:spAutoFit/>
-          </a:bodyPr>
-          <a:lstStyle/>
-          <a:p>
-            <a:r>
-              <a:rPr lang="nb-NO" sz="2800" b="1" dirty="0"/>
-              <a:t>Nostria Architecture v1.0</a:t>
-            </a:r>
-          </a:p>
-        </p:txBody>
-      </p:sp>
-      <p:sp>
-        <p:nvSpPr>
-          <p:cNvPr id="9" name="TextBox 8">
-            <a:extLst>
-              <a:ext uri="{FF2B5EF4-FFF2-40B4-BE49-F238E27FC236}">
-                <a16:creationId xmlns:a16="http://schemas.microsoft.com/office/drawing/2014/main" id="{DBE24D3C-D9F0-7686-FCA4-96F302F070AD}"/>
-              </a:ext>
-            </a:extLst>
-          </p:cNvPr>
-          <p:cNvSpPr txBox="1"/>
-          <p:nvPr/>
-        </p:nvSpPr>
-        <p:spPr>
-          <a:xfrm>
-            <a:off x="2269104" y="2175236"/>
-            <a:ext cx="1625766" cy="769441"/>
-          </a:xfrm>
-          <a:prstGeom prst="rect">
-            <a:avLst/>
-          </a:prstGeom>
-          <a:noFill/>
-        </p:spPr>
-        <p:txBody>
-          <a:bodyPr wrap="none" rtlCol="0">
-            <a:spAutoFit/>
-          </a:bodyPr>
-          <a:lstStyle/>
-          <a:p>
-            <a:pPr algn="ctr"/>
-            <a:r>
-              <a:rPr lang="nb-NO" sz="1100" dirty="0"/>
-              <a:t>Nostria User</a:t>
-            </a:r>
-          </a:p>
-          <a:p>
-            <a:pPr algn="ctr"/>
-            <a:r>
-              <a:rPr lang="nb-NO" sz="1100" dirty="0">
-                <a:solidFill>
-                  <a:schemeClr val="bg2">
-                    <a:lumMod val="50000"/>
-                  </a:schemeClr>
-                </a:solidFill>
-              </a:rPr>
-              <a:t>When signing up, users is</a:t>
-            </a:r>
-          </a:p>
-          <a:p>
-            <a:pPr algn="ctr"/>
-            <a:r>
-              <a:rPr lang="nb-NO" sz="1100" dirty="0">
-                <a:solidFill>
-                  <a:schemeClr val="bg2">
-                    <a:lumMod val="50000"/>
-                  </a:schemeClr>
-                </a:solidFill>
-              </a:rPr>
-              <a:t>assigned user relay</a:t>
-            </a:r>
-          </a:p>
-          <a:p>
-            <a:pPr algn="ctr"/>
-            <a:r>
-              <a:rPr lang="nb-NO" sz="1100" dirty="0">
-                <a:solidFill>
-                  <a:schemeClr val="bg2">
-                    <a:lumMod val="50000"/>
-                  </a:schemeClr>
-                </a:solidFill>
-              </a:rPr>
-              <a:t>and media server</a:t>
-            </a:r>
-          </a:p>
-        </p:txBody>
-      </p:sp>
-      <p:sp>
-        <p:nvSpPr>
-          <p:cNvPr id="19" name="TextBox 18">
-            <a:extLst>
-              <a:ext uri="{FF2B5EF4-FFF2-40B4-BE49-F238E27FC236}">
-                <a16:creationId xmlns:a16="http://schemas.microsoft.com/office/drawing/2014/main" id="{1092C501-C086-E0A6-E052-B4CA94B22934}"/>
-              </a:ext>
-            </a:extLst>
-          </p:cNvPr>
-          <p:cNvSpPr txBox="1"/>
-          <p:nvPr/>
-        </p:nvSpPr>
-        <p:spPr>
-          <a:xfrm>
-            <a:off x="6155873" y="1579105"/>
-            <a:ext cx="4007094" cy="769441"/>
-          </a:xfrm>
-          <a:prstGeom prst="rect">
-            <a:avLst/>
-          </a:prstGeom>
-          <a:noFill/>
-        </p:spPr>
-        <p:txBody>
-          <a:bodyPr wrap="square" rtlCol="0">
-            <a:spAutoFit/>
-          </a:bodyPr>
-          <a:lstStyle/>
-          <a:p>
-            <a:r>
-              <a:rPr lang="nb-NO" sz="1100" dirty="0"/>
-              <a:t>1. Discovery of users</a:t>
-            </a:r>
-          </a:p>
-          <a:p>
-            <a:r>
-              <a:rPr lang="nb-NO" sz="1100" dirty="0">
-                <a:solidFill>
-                  <a:schemeClr val="bg2">
-                    <a:lumMod val="50000"/>
-                  </a:schemeClr>
-                </a:solidFill>
-              </a:rPr>
-              <a:t>When looking up a user on Nostria, a request is sent to the Discovery Relay to find the User Relays. The Discovery relay holds a global list of all Nostr users, not just Nostria users.</a:t>
-            </a:r>
-          </a:p>
-        </p:txBody>
-      </p:sp>
-      <p:sp>
-        <p:nvSpPr>
-          <p:cNvPr id="24" name="TextBox 23">
-            <a:extLst>
-              <a:ext uri="{FF2B5EF4-FFF2-40B4-BE49-F238E27FC236}">
-                <a16:creationId xmlns:a16="http://schemas.microsoft.com/office/drawing/2014/main" id="{0079A2CC-6BC4-D707-FDA8-D43841660DE7}"/>
-              </a:ext>
-            </a:extLst>
-          </p:cNvPr>
-          <p:cNvSpPr txBox="1"/>
-          <p:nvPr/>
-        </p:nvSpPr>
-        <p:spPr>
-          <a:xfrm>
-            <a:off x="6151633" y="3511232"/>
-            <a:ext cx="4007094" cy="1107996"/>
-          </a:xfrm>
-          <a:prstGeom prst="rect">
-            <a:avLst/>
-          </a:prstGeom>
-          <a:noFill/>
-        </p:spPr>
-        <p:txBody>
-          <a:bodyPr wrap="square" rtlCol="0">
-            <a:spAutoFit/>
-          </a:bodyPr>
-          <a:lstStyle/>
-          <a:p>
-            <a:r>
-              <a:rPr lang="nb-NO" sz="1100" dirty="0"/>
-              <a:t>3. Interacting with users</a:t>
-            </a:r>
-          </a:p>
-          <a:p>
-            <a:r>
-              <a:rPr lang="nb-NO" sz="1100" dirty="0">
-                <a:solidFill>
-                  <a:schemeClr val="bg2">
-                    <a:lumMod val="50000"/>
-                  </a:schemeClr>
-                </a:solidFill>
-              </a:rPr>
-              <a:t>When Nostria user’s interact with other users, commenting on their posts, send direct messages or join group chats, Nostria will publish events both to the receivers and the the current user’s relays. This ensures the user always has a full set of their data, accessible on their user relays.</a:t>
-            </a:r>
-          </a:p>
-        </p:txBody>
-      </p:sp>
-      <p:pic>
-        <p:nvPicPr>
-          <p:cNvPr id="25" name="Graphic 24">
-            <a:extLst>
-              <a:ext uri="{FF2B5EF4-FFF2-40B4-BE49-F238E27FC236}">
-                <a16:creationId xmlns:a16="http://schemas.microsoft.com/office/drawing/2014/main" id="{47C98919-C330-D750-AAD0-FA67DF084A13}"/>
-              </a:ext>
-            </a:extLst>
-          </p:cNvPr>
-          <p:cNvPicPr>
-            <a:picLocks noChangeAspect="1"/>
-          </p:cNvPicPr>
-          <p:nvPr/>
-        </p:nvPicPr>
-        <p:blipFill>
-          <a:blip r:embed="rId4">
-            <a:lum/>
-            <a:extLst>
-              <a:ext uri="{96DAC541-7B7A-43D3-8B79-37D633B846F1}">
-                <asvg:svgBlip xmlns:asvg="http://schemas.microsoft.com/office/drawing/2016/SVG/main" r:embed="rId5"/>
-              </a:ext>
-            </a:extLst>
-          </a:blip>
-          <a:srcRect/>
-          <a:stretch>
-            <a:fillRect/>
-          </a:stretch>
-        </p:blipFill>
-        <p:spPr bwMode="white">
-          <a:xfrm>
-            <a:off x="6254322" y="4784737"/>
-            <a:ext cx="542004" cy="542004"/>
-          </a:xfrm>
-          <a:prstGeom prst="rect">
-            <a:avLst/>
-          </a:prstGeom>
-          <a:ln>
-            <a:headEnd type="none"/>
-            <a:tailEnd type="none"/>
-          </a:ln>
-        </p:spPr>
-      </p:pic>
-      <p:sp>
-        <p:nvSpPr>
-          <p:cNvPr id="26" name="Rectangle: Rounded Corners 25">
-            <a:extLst>
-              <a:ext uri="{FF2B5EF4-FFF2-40B4-BE49-F238E27FC236}">
-                <a16:creationId xmlns:a16="http://schemas.microsoft.com/office/drawing/2014/main" id="{4B121327-1D1B-04EF-AE85-74F50D923001}"/>
-              </a:ext>
-            </a:extLst>
-          </p:cNvPr>
-          <p:cNvSpPr/>
-          <p:nvPr/>
-        </p:nvSpPr>
-        <p:spPr>
-          <a:xfrm>
-            <a:off x="6167397" y="5562224"/>
-            <a:ext cx="1563028" cy="742347"/>
-          </a:xfrm>
-          <a:prstGeom prst="roundRect">
-            <a:avLst/>
-          </a:prstGeom>
-          <a:ln>
-            <a:prstDash val="dash"/>
-          </a:ln>
-        </p:spPr>
-        <p:style>
-          <a:lnRef idx="2">
-            <a:schemeClr val="dk1"/>
-          </a:lnRef>
-          <a:fillRef idx="1">
-            <a:schemeClr val="lt1"/>
-          </a:fillRef>
-          <a:effectRef idx="0">
-            <a:schemeClr val="dk1"/>
-          </a:effectRef>
-          <a:fontRef idx="minor">
-            <a:schemeClr val="dk1"/>
-          </a:fontRef>
-        </p:style>
-        <p:txBody>
-          <a:bodyPr rtlCol="0" anchor="ctr"/>
-          <a:lstStyle/>
-          <a:p>
-            <a:pPr algn="ctr"/>
-            <a:endParaRPr lang="nb-NO" dirty="0"/>
-          </a:p>
-        </p:txBody>
-      </p:sp>
-      <p:pic>
-        <p:nvPicPr>
-          <p:cNvPr id="27" name="Graphic 26">
-            <a:extLst>
-              <a:ext uri="{FF2B5EF4-FFF2-40B4-BE49-F238E27FC236}">
-                <a16:creationId xmlns:a16="http://schemas.microsoft.com/office/drawing/2014/main" id="{B7292FE3-4613-160E-4C22-314525B45B44}"/>
-              </a:ext>
-            </a:extLst>
-          </p:cNvPr>
-          <p:cNvPicPr>
-            <a:picLocks noChangeAspect="1"/>
-          </p:cNvPicPr>
-          <p:nvPr/>
-        </p:nvPicPr>
-        <p:blipFill>
-          <a:blip r:embed="rId6">
-            <a:lum/>
-            <a:extLst>
-              <a:ext uri="{96DAC541-7B7A-43D3-8B79-37D633B846F1}">
-                <asvg:svgBlip xmlns:asvg="http://schemas.microsoft.com/office/drawing/2016/SVG/main" r:embed="rId7"/>
-              </a:ext>
-            </a:extLst>
-          </a:blip>
-          <a:srcRect/>
-          <a:stretch>
-            <a:fillRect/>
-          </a:stretch>
-        </p:blipFill>
-        <p:spPr bwMode="white">
-          <a:xfrm>
-            <a:off x="7275415" y="5623133"/>
-            <a:ext cx="317500" cy="317500"/>
-          </a:xfrm>
-          <a:prstGeom prst="rect">
-            <a:avLst/>
-          </a:prstGeom>
-          <a:ln>
-            <a:headEnd type="none"/>
-            <a:tailEnd type="none"/>
-          </a:ln>
-        </p:spPr>
-      </p:pic>
-      <p:pic>
-        <p:nvPicPr>
-          <p:cNvPr id="28" name="Graphic 27">
-            <a:extLst>
-              <a:ext uri="{FF2B5EF4-FFF2-40B4-BE49-F238E27FC236}">
-                <a16:creationId xmlns:a16="http://schemas.microsoft.com/office/drawing/2014/main" id="{E44A8033-3F22-57E7-BC26-A5FC65026D50}"/>
-              </a:ext>
-            </a:extLst>
-          </p:cNvPr>
-          <p:cNvPicPr>
-            <a:picLocks noChangeAspect="1"/>
-          </p:cNvPicPr>
-          <p:nvPr/>
-        </p:nvPicPr>
-        <p:blipFill>
-          <a:blip r:embed="rId6">
-            <a:lum/>
-            <a:extLst>
-              <a:ext uri="{96DAC541-7B7A-43D3-8B79-37D633B846F1}">
-                <asvg:svgBlip xmlns:asvg="http://schemas.microsoft.com/office/drawing/2016/SVG/main" r:embed="rId7"/>
-              </a:ext>
-            </a:extLst>
-          </a:blip>
-          <a:srcRect/>
-          <a:stretch>
-            <a:fillRect/>
-          </a:stretch>
-        </p:blipFill>
-        <p:spPr bwMode="white">
-          <a:xfrm>
-            <a:off x="7275342" y="5932615"/>
-            <a:ext cx="317500" cy="317500"/>
-          </a:xfrm>
-          <a:prstGeom prst="rect">
-            <a:avLst/>
-          </a:prstGeom>
-          <a:ln>
-            <a:headEnd type="none"/>
-            <a:tailEnd type="none"/>
-          </a:ln>
-        </p:spPr>
-      </p:pic>
-      <p:pic>
-        <p:nvPicPr>
-          <p:cNvPr id="31" name="Graphic 30">
-            <a:extLst>
-              <a:ext uri="{FF2B5EF4-FFF2-40B4-BE49-F238E27FC236}">
-                <a16:creationId xmlns:a16="http://schemas.microsoft.com/office/drawing/2014/main" id="{E736218D-3632-AA3D-EF9F-5D02BBE87BE7}"/>
-              </a:ext>
-            </a:extLst>
-          </p:cNvPr>
-          <p:cNvPicPr>
-            <a:picLocks noChangeAspect="1"/>
-          </p:cNvPicPr>
-          <p:nvPr/>
-        </p:nvPicPr>
-        <p:blipFill>
-          <a:blip r:embed="rId6">
-            <a:lum/>
-            <a:extLst>
-              <a:ext uri="{96DAC541-7B7A-43D3-8B79-37D633B846F1}">
-                <asvg:svgBlip xmlns:asvg="http://schemas.microsoft.com/office/drawing/2016/SVG/main" r:embed="rId7"/>
-              </a:ext>
-            </a:extLst>
-          </a:blip>
-          <a:srcRect/>
-          <a:stretch>
-            <a:fillRect/>
-          </a:stretch>
-        </p:blipFill>
-        <p:spPr bwMode="white">
-          <a:xfrm>
-            <a:off x="6827854" y="5605048"/>
-            <a:ext cx="317500" cy="317500"/>
-          </a:xfrm>
-          <a:prstGeom prst="rect">
-            <a:avLst/>
-          </a:prstGeom>
-          <a:ln>
-            <a:headEnd type="none"/>
-            <a:tailEnd type="none"/>
-          </a:ln>
-        </p:spPr>
-      </p:pic>
-      <p:pic>
-        <p:nvPicPr>
-          <p:cNvPr id="42" name="Graphic 41">
-            <a:extLst>
-              <a:ext uri="{FF2B5EF4-FFF2-40B4-BE49-F238E27FC236}">
-                <a16:creationId xmlns:a16="http://schemas.microsoft.com/office/drawing/2014/main" id="{7A6EBEAD-1088-9402-35BE-5BA8F3236B71}"/>
-              </a:ext>
-            </a:extLst>
-          </p:cNvPr>
-          <p:cNvPicPr>
-            <a:picLocks noChangeAspect="1"/>
-          </p:cNvPicPr>
-          <p:nvPr/>
-        </p:nvPicPr>
-        <p:blipFill>
-          <a:blip r:embed="rId6">
-            <a:lum/>
-            <a:extLst>
-              <a:ext uri="{96DAC541-7B7A-43D3-8B79-37D633B846F1}">
-                <asvg:svgBlip xmlns:asvg="http://schemas.microsoft.com/office/drawing/2016/SVG/main" r:embed="rId7"/>
-              </a:ext>
-            </a:extLst>
-          </a:blip>
-          <a:srcRect/>
-          <a:stretch>
-            <a:fillRect/>
-          </a:stretch>
-        </p:blipFill>
-        <p:spPr bwMode="white">
-          <a:xfrm>
-            <a:off x="6846754" y="5908411"/>
-            <a:ext cx="317500" cy="317500"/>
-          </a:xfrm>
-          <a:prstGeom prst="rect">
-            <a:avLst/>
-          </a:prstGeom>
-          <a:ln>
-            <a:headEnd type="none"/>
-            <a:tailEnd type="none"/>
-          </a:ln>
-        </p:spPr>
-      </p:pic>
-      <p:pic>
-        <p:nvPicPr>
-          <p:cNvPr id="43" name="Graphic 42">
-            <a:extLst>
-              <a:ext uri="{FF2B5EF4-FFF2-40B4-BE49-F238E27FC236}">
-                <a16:creationId xmlns:a16="http://schemas.microsoft.com/office/drawing/2014/main" id="{2793CB11-4222-2C57-E701-BEE5A64B84B8}"/>
-              </a:ext>
-            </a:extLst>
-          </p:cNvPr>
-          <p:cNvPicPr>
-            <a:picLocks noChangeAspect="1"/>
-          </p:cNvPicPr>
-          <p:nvPr/>
-        </p:nvPicPr>
-        <p:blipFill>
-          <a:blip r:embed="rId4">
-            <a:lum/>
-            <a:extLst>
-              <a:ext uri="{96DAC541-7B7A-43D3-8B79-37D633B846F1}">
-                <asvg:svgBlip xmlns:asvg="http://schemas.microsoft.com/office/drawing/2016/SVG/main" r:embed="rId5"/>
-              </a:ext>
-            </a:extLst>
-          </a:blip>
-          <a:srcRect/>
-          <a:stretch>
-            <a:fillRect/>
-          </a:stretch>
-        </p:blipFill>
-        <p:spPr bwMode="white">
-          <a:xfrm>
-            <a:off x="6270086" y="5636778"/>
-            <a:ext cx="542004" cy="542004"/>
-          </a:xfrm>
-          <a:prstGeom prst="rect">
-            <a:avLst/>
-          </a:prstGeom>
-          <a:ln>
-            <a:headEnd type="none"/>
-            <a:tailEnd type="none"/>
-          </a:ln>
-        </p:spPr>
-      </p:pic>
-      <p:cxnSp>
-        <p:nvCxnSpPr>
-          <p:cNvPr id="46" name="Connector: Elbow 45">
-            <a:extLst>
-              <a:ext uri="{FF2B5EF4-FFF2-40B4-BE49-F238E27FC236}">
-                <a16:creationId xmlns:a16="http://schemas.microsoft.com/office/drawing/2014/main" id="{31371E35-E488-F0A1-1649-7F4EF09E0EF2}"/>
-              </a:ext>
-            </a:extLst>
-          </p:cNvPr>
-          <p:cNvCxnSpPr>
-            <a:cxnSpLocks/>
-            <a:stCxn id="6" idx="1"/>
-            <a:endCxn id="11" idx="2"/>
-          </p:cNvCxnSpPr>
-          <p:nvPr/>
-        </p:nvCxnSpPr>
-        <p:spPr>
-          <a:xfrm rot="10800000">
-            <a:off x="3079375" y="4581053"/>
-            <a:ext cx="3072259" cy="500304"/>
-          </a:xfrm>
-          <a:prstGeom prst="bentConnector2">
-            <a:avLst/>
-          </a:prstGeom>
-          <a:ln>
-            <a:headEnd type="triangle"/>
-            <a:tailEnd type="triangle"/>
-          </a:ln>
-        </p:spPr>
-        <p:style>
-          <a:lnRef idx="1">
-            <a:schemeClr val="accent1"/>
-          </a:lnRef>
-          <a:fillRef idx="0">
-            <a:schemeClr val="accent1"/>
-          </a:fillRef>
-          <a:effectRef idx="0">
-            <a:schemeClr val="accent1"/>
-          </a:effectRef>
-          <a:fontRef idx="minor">
-            <a:schemeClr val="tx1"/>
-          </a:fontRef>
-        </p:style>
-      </p:cxnSp>
-      <p:cxnSp>
-        <p:nvCxnSpPr>
-          <p:cNvPr id="48" name="Connector: Elbow 47">
-            <a:extLst>
-              <a:ext uri="{FF2B5EF4-FFF2-40B4-BE49-F238E27FC236}">
-                <a16:creationId xmlns:a16="http://schemas.microsoft.com/office/drawing/2014/main" id="{BB524125-4753-F78F-7872-5393E3659D8D}"/>
-              </a:ext>
-            </a:extLst>
-          </p:cNvPr>
-          <p:cNvCxnSpPr>
-            <a:cxnSpLocks/>
-            <a:stCxn id="26" idx="1"/>
-            <a:endCxn id="11" idx="2"/>
-          </p:cNvCxnSpPr>
-          <p:nvPr/>
-        </p:nvCxnSpPr>
-        <p:spPr>
-          <a:xfrm rot="10800000">
-            <a:off x="3079375" y="4581054"/>
-            <a:ext cx="3088023" cy="1352345"/>
-          </a:xfrm>
-          <a:prstGeom prst="bentConnector2">
-            <a:avLst/>
-          </a:prstGeom>
-          <a:ln>
-            <a:headEnd type="triangle"/>
-            <a:tailEnd type="triangle"/>
-          </a:ln>
-        </p:spPr>
-        <p:style>
-          <a:lnRef idx="1">
-            <a:schemeClr val="accent1"/>
-          </a:lnRef>
-          <a:fillRef idx="0">
-            <a:schemeClr val="accent1"/>
-          </a:fillRef>
-          <a:effectRef idx="0">
-            <a:schemeClr val="accent1"/>
-          </a:effectRef>
-          <a:fontRef idx="minor">
-            <a:schemeClr val="tx1"/>
-          </a:fontRef>
-        </p:style>
-      </p:cxnSp>
-      <p:cxnSp>
-        <p:nvCxnSpPr>
-          <p:cNvPr id="70" name="Connector: Elbow 69">
-            <a:extLst>
-              <a:ext uri="{FF2B5EF4-FFF2-40B4-BE49-F238E27FC236}">
-                <a16:creationId xmlns:a16="http://schemas.microsoft.com/office/drawing/2014/main" id="{43060D9E-3396-9FE0-CACD-7065B28D6BE7}"/>
-              </a:ext>
-            </a:extLst>
-          </p:cNvPr>
-          <p:cNvCxnSpPr>
-            <a:stCxn id="11" idx="3"/>
-            <a:endCxn id="15" idx="1"/>
-          </p:cNvCxnSpPr>
-          <p:nvPr/>
-        </p:nvCxnSpPr>
-        <p:spPr>
-          <a:xfrm flipV="1">
-            <a:off x="4242838" y="1785013"/>
-            <a:ext cx="890855" cy="1198104"/>
-          </a:xfrm>
-          <a:prstGeom prst="bentConnector3">
-            <a:avLst/>
-          </a:prstGeom>
-          <a:ln>
-            <a:headEnd type="triangle"/>
-            <a:tailEnd type="triangle"/>
-          </a:ln>
-        </p:spPr>
-        <p:style>
-          <a:lnRef idx="1">
-            <a:schemeClr val="accent1"/>
-          </a:lnRef>
-          <a:fillRef idx="0">
-            <a:schemeClr val="accent1"/>
-          </a:fillRef>
-          <a:effectRef idx="0">
-            <a:schemeClr val="accent1"/>
-          </a:effectRef>
-          <a:fontRef idx="minor">
-            <a:schemeClr val="tx1"/>
-          </a:fontRef>
-        </p:style>
-      </p:cxnSp>
-      <p:sp>
-        <p:nvSpPr>
-          <p:cNvPr id="76" name="TextBox 75">
-            <a:extLst>
-              <a:ext uri="{FF2B5EF4-FFF2-40B4-BE49-F238E27FC236}">
-                <a16:creationId xmlns:a16="http://schemas.microsoft.com/office/drawing/2014/main" id="{013D1133-F64E-AC0D-22CD-308962275B73}"/>
-              </a:ext>
-            </a:extLst>
-          </p:cNvPr>
-          <p:cNvSpPr txBox="1"/>
-          <p:nvPr/>
-        </p:nvSpPr>
-        <p:spPr>
-          <a:xfrm>
-            <a:off x="6153703" y="2372664"/>
-            <a:ext cx="4007094" cy="1107996"/>
-          </a:xfrm>
-          <a:prstGeom prst="rect">
-            <a:avLst/>
-          </a:prstGeom>
-          <a:noFill/>
-        </p:spPr>
-        <p:txBody>
-          <a:bodyPr wrap="square" rtlCol="0">
-            <a:spAutoFit/>
-          </a:bodyPr>
-          <a:lstStyle/>
-          <a:p>
-            <a:r>
-              <a:rPr lang="nb-NO" sz="1100" dirty="0"/>
-              <a:t>2. User Profiles</a:t>
-            </a:r>
-          </a:p>
-          <a:p>
-            <a:r>
-              <a:rPr lang="nb-NO" sz="1100" dirty="0">
-                <a:solidFill>
-                  <a:schemeClr val="bg2">
-                    <a:lumMod val="50000"/>
-                  </a:schemeClr>
-                </a:solidFill>
-              </a:rPr>
-              <a:t>After discovery of a user’s relays on the Discovery Relay, Nostria will connect to that user’s relays to retrieve their updated profile and other information that is relevant. User’s does not need to utilize a large centralized relay to be discovered, they only need a small set of reliable relays and media servers.</a:t>
-            </a:r>
-          </a:p>
-        </p:txBody>
-      </p:sp>
-    </p:spTree>
-    <p:extLst>
-      <p:ext uri="{BB962C8B-B14F-4D97-AF65-F5344CB8AC3E}">
-        <p14:creationId xmlns:p14="http://schemas.microsoft.com/office/powerpoint/2010/main" val="1107573680"/>
-      </p:ext>
-    </p:extLst>
-  </p:cSld>
-  <p:clrMapOvr>
-    <a:masterClrMapping/>
-  </p:clrMapOvr>
-</p:sld>
-</file>
-
-<file path=ppt/slides/slide3.xml><?xml version="1.0" encoding="utf-8"?>
-<p:sld xmlns:a="http://schemas.openxmlformats.org/drawingml/2006/main" xmlns:r="http://schemas.openxmlformats.org/officeDocument/2006/relationships" xmlns:p="http://schemas.openxmlformats.org/presentationml/2006/main">
-  <p:cSld>
-    <p:spTree>
-      <p:nvGrpSpPr>
-        <p:cNvPr id="1" name="">
-          <a:extLst>
-            <a:ext uri="{FF2B5EF4-FFF2-40B4-BE49-F238E27FC236}">
               <a16:creationId xmlns:a16="http://schemas.microsoft.com/office/drawing/2014/main" id="{F6194CEF-CDF8-568F-7D61-C9C9DC3BEC43}"/>
             </a:ext>
           </a:extLst>

</xml_diff>